<commit_message>
Fixes typo in keras sheet
</commit_message>
<xml_diff>
--- a/powerpoints/keras.pptx
+++ b/powerpoints/keras.pptx
@@ -23983,7 +23983,7 @@
       </p:sp>
       <p:sp>
         <p:nvSpPr>
-          <p:cNvPr id="460" name="See ?keras_install for GPU instructions"/>
+          <p:cNvPr id="460" name="See ?install_keras for GPU instructions"/>
           <p:cNvSpPr txBox="1"/>
           <p:nvPr/>
         </p:nvSpPr>
@@ -24030,7 +24030,7 @@
           <a:p>
             <a:pPr/>
             <a:r>
-              <a:t>See ?keras_install for GPU instructions</a:t>
+              <a:t>See ?install_keras for GPU instructions</a:t>
             </a:r>
           </a:p>
         </p:txBody>

</xml_diff>

<commit_message>
Fixes resolution on remaining cheatsheets
</commit_message>
<xml_diff>
--- a/powerpoints/keras.pptx
+++ b/powerpoints/keras.pptx
@@ -16302,38 +16302,9 @@
           </a:p>
         </p:txBody>
       </p:sp>
-      <p:pic>
-        <p:nvPicPr>
-          <p:cNvPr id="344" name="pasted-image.pdf" descr="pasted-image.pdf"/>
-          <p:cNvPicPr>
-            <a:picLocks noChangeAspect="1"/>
-          </p:cNvPicPr>
-          <p:nvPr/>
-        </p:nvPicPr>
-        <p:blipFill>
-          <a:blip r:embed="rId3">
-            <a:extLst/>
-          </a:blip>
-          <a:stretch>
-            <a:fillRect/>
-          </a:stretch>
-        </p:blipFill>
-        <p:spPr>
-          <a:xfrm>
-            <a:off x="238822" y="9978473"/>
-            <a:ext cx="1754523" cy="616479"/>
-          </a:xfrm>
-          <a:prstGeom prst="rect">
-            <a:avLst/>
-          </a:prstGeom>
-          <a:ln w="12700">
-            <a:miter lim="400000"/>
-          </a:ln>
-        </p:spPr>
-      </p:pic>
       <p:sp>
         <p:nvSpPr>
-          <p:cNvPr id="345" name="RStudio® is a trademark of RStudio, Inc.  •  CC BY RStudio •  info@rstudio.com  •  844-448-1212 • rstudio.com •  Learn more at spark.rstudio.com  •  sparklyr  0.5  •  Updated: 2016-12"/>
+          <p:cNvPr id="344" name="RStudio® is a trademark of RStudio, Inc.  •  CC BY RStudio •  info@rstudio.com  •  844-448-1212 • rstudio.com •  Learn more at spark.rstudio.com  •  sparklyr  0.5  •  Updated: 2016-12"/>
           <p:cNvSpPr txBox="1"/>
           <p:nvPr/>
         </p:nvSpPr>
@@ -16382,15 +16353,40 @@
             </a:r>
             <a:r>
               <a:rPr>
+                <a:hlinkClick r:id="rId3" invalidUrl="" action="" tgtFrame="" tooltip="" history="1" highlightClick="0" endSnd="0"/>
+              </a:rPr>
+              <a:t>CC BY SA</a:t>
+            </a:r>
+            <a:r>
+              <a:t>  </a:t>
+            </a:r>
+            <a:r>
+              <a:t>RStudio •  </a:t>
+            </a:r>
+            <a:r>
+              <a:rPr u="sng">
+                <a:solidFill>
+                  <a:srgbClr val="D77A00"/>
+                </a:solidFill>
+                <a:uFill>
+                  <a:solidFill>
+                    <a:srgbClr val="0000FF"/>
+                  </a:solidFill>
+                </a:uFill>
                 <a:hlinkClick r:id="rId4" invalidUrl="" action="" tgtFrame="" tooltip="" history="1" highlightClick="0" endSnd="0"/>
               </a:rPr>
-              <a:t>CC BY SA</a:t>
-            </a:r>
-            <a:r>
+              <a:t>info@rstudio.com</a:t>
+            </a:r>
+            <a:r>
+              <a:rPr>
+                <a:solidFill>
+                  <a:srgbClr val="D77A00"/>
+                </a:solidFill>
+              </a:rPr>
               <a:t>  </a:t>
             </a:r>
             <a:r>
-              <a:t>RStudio •  </a:t>
+              <a:t>•  844-448-1212 • </a:t>
             </a:r>
             <a:r>
               <a:rPr u="sng">
@@ -16404,31 +16400,6 @@
                 </a:uFill>
                 <a:hlinkClick r:id="rId5" invalidUrl="" action="" tgtFrame="" tooltip="" history="1" highlightClick="0" endSnd="0"/>
               </a:rPr>
-              <a:t>info@rstudio.com</a:t>
-            </a:r>
-            <a:r>
-              <a:rPr>
-                <a:solidFill>
-                  <a:srgbClr val="D77A00"/>
-                </a:solidFill>
-              </a:rPr>
-              <a:t>  </a:t>
-            </a:r>
-            <a:r>
-              <a:t>•  844-448-1212 • </a:t>
-            </a:r>
-            <a:r>
-              <a:rPr u="sng">
-                <a:solidFill>
-                  <a:srgbClr val="D77A00"/>
-                </a:solidFill>
-                <a:uFill>
-                  <a:solidFill>
-                    <a:srgbClr val="0000FF"/>
-                  </a:solidFill>
-                </a:uFill>
-                <a:hlinkClick r:id="rId6" invalidUrl="" action="" tgtFrame="" tooltip="" history="1" highlightClick="0" endSnd="0"/>
-              </a:rPr>
               <a:t>rstudio.com</a:t>
             </a:r>
             <a:r>
@@ -16470,7 +16441,7 @@
       </p:sp>
       <p:sp>
         <p:nvSpPr>
-          <p:cNvPr id="346" name="dplyr verb…"/>
+          <p:cNvPr id="345" name="dplyr verb…"/>
           <p:cNvSpPr txBox="1"/>
           <p:nvPr/>
         </p:nvSpPr>
@@ -16563,7 +16534,7 @@
       </p:sp>
       <p:sp>
         <p:nvSpPr>
-          <p:cNvPr id="347" name="Export an R DataFrame…"/>
+          <p:cNvPr id="346" name="Export an R DataFrame…"/>
           <p:cNvSpPr txBox="1"/>
           <p:nvPr/>
         </p:nvSpPr>
@@ -16656,7 +16627,7 @@
       </p:sp>
       <p:sp>
         <p:nvSpPr>
-          <p:cNvPr id="348" name="Arrow"/>
+          <p:cNvPr id="347" name="Arrow"/>
           <p:cNvSpPr/>
           <p:nvPr/>
         </p:nvSpPr>
@@ -16704,7 +16675,7 @@
       </p:sp>
       <p:sp>
         <p:nvSpPr>
-          <p:cNvPr id="349" name="Arrow"/>
+          <p:cNvPr id="348" name="Arrow"/>
           <p:cNvSpPr/>
           <p:nvPr/>
         </p:nvSpPr>
@@ -16752,7 +16723,7 @@
       </p:sp>
       <p:sp>
         <p:nvSpPr>
-          <p:cNvPr id="350" name="Import"/>
+          <p:cNvPr id="349" name="Import"/>
           <p:cNvSpPr txBox="1"/>
           <p:nvPr/>
         </p:nvSpPr>
@@ -16803,7 +16774,7 @@
       </p:sp>
       <p:sp>
         <p:nvSpPr>
-          <p:cNvPr id="351" name="Tidy"/>
+          <p:cNvPr id="350" name="Tidy"/>
           <p:cNvSpPr txBox="1"/>
           <p:nvPr/>
         </p:nvSpPr>
@@ -16854,7 +16825,7 @@
       </p:sp>
       <p:sp>
         <p:nvSpPr>
-          <p:cNvPr id="352" name="dplyr verb…"/>
+          <p:cNvPr id="351" name="dplyr verb…"/>
           <p:cNvSpPr txBox="1"/>
           <p:nvPr/>
         </p:nvSpPr>
@@ -16947,7 +16918,7 @@
       </p:sp>
       <p:sp>
         <p:nvSpPr>
-          <p:cNvPr id="353" name="Tidy"/>
+          <p:cNvPr id="352" name="Tidy"/>
           <p:cNvSpPr txBox="1"/>
           <p:nvPr/>
         </p:nvSpPr>
@@ -16998,7 +16969,7 @@
       </p:sp>
       <p:sp>
         <p:nvSpPr>
-          <p:cNvPr id="354" name="Arrow"/>
+          <p:cNvPr id="353" name="Arrow"/>
           <p:cNvSpPr/>
           <p:nvPr/>
         </p:nvSpPr>
@@ -17046,7 +17017,7 @@
       </p:sp>
       <p:sp>
         <p:nvSpPr>
-          <p:cNvPr id="355" name="dplyr verb…"/>
+          <p:cNvPr id="354" name="dplyr verb…"/>
           <p:cNvSpPr txBox="1"/>
           <p:nvPr/>
         </p:nvSpPr>
@@ -17118,7 +17089,7 @@
       </p:sp>
       <p:sp>
         <p:nvSpPr>
-          <p:cNvPr id="356" name="Tidy"/>
+          <p:cNvPr id="355" name="Tidy"/>
           <p:cNvSpPr txBox="1"/>
           <p:nvPr/>
         </p:nvSpPr>
@@ -17169,7 +17140,7 @@
       </p:sp>
       <p:sp>
         <p:nvSpPr>
-          <p:cNvPr id="357" name="Arrow"/>
+          <p:cNvPr id="356" name="Arrow"/>
           <p:cNvSpPr/>
           <p:nvPr/>
         </p:nvSpPr>
@@ -17217,7 +17188,7 @@
       </p:sp>
       <p:sp>
         <p:nvSpPr>
-          <p:cNvPr id="358" name="dplyr verb…"/>
+          <p:cNvPr id="357" name="dplyr verb…"/>
           <p:cNvSpPr txBox="1"/>
           <p:nvPr/>
         </p:nvSpPr>
@@ -17289,7 +17260,7 @@
       </p:sp>
       <p:sp>
         <p:nvSpPr>
-          <p:cNvPr id="359" name="Tidy"/>
+          <p:cNvPr id="358" name="Tidy"/>
           <p:cNvSpPr txBox="1"/>
           <p:nvPr/>
         </p:nvSpPr>
@@ -17340,7 +17311,7 @@
       </p:sp>
       <p:sp>
         <p:nvSpPr>
-          <p:cNvPr id="360" name="Line"/>
+          <p:cNvPr id="359" name="Line"/>
           <p:cNvSpPr/>
           <p:nvPr/>
         </p:nvSpPr>
@@ -17369,7 +17340,7 @@
       </p:sp>
       <p:sp>
         <p:nvSpPr>
-          <p:cNvPr id="361" name="Thank you for making a new cheatsheet for R! These cheatsheets have an important job:"/>
+          <p:cNvPr id="360" name="Thank you for making a new cheatsheet for R! These cheatsheets have an important job:"/>
           <p:cNvSpPr txBox="1"/>
           <p:nvPr/>
         </p:nvSpPr>
@@ -17433,7 +17404,7 @@
       </p:sp>
       <p:sp>
         <p:nvSpPr>
-          <p:cNvPr id="362" name="ggplot(mpg, aes(hwy, cty)) +…"/>
+          <p:cNvPr id="361" name="ggplot(mpg, aes(hwy, cty)) +…"/>
           <p:cNvSpPr txBox="1"/>
           <p:nvPr/>
         </p:nvSpPr>
@@ -17507,7 +17478,7 @@
       </p:sp>
       <p:sp>
         <p:nvSpPr>
-          <p:cNvPr id="363" name="Thank you for making a new cheatsheet for R! These cheatsheets have an important job:"/>
+          <p:cNvPr id="362" name="Thank you for making a new cheatsheet for R! These cheatsheets have an important job:"/>
           <p:cNvSpPr txBox="1"/>
           <p:nvPr/>
         </p:nvSpPr>
@@ -17571,7 +17542,7 @@
       </p:sp>
       <p:sp>
         <p:nvSpPr>
-          <p:cNvPr id="364" name="SUBTITLE"/>
+          <p:cNvPr id="363" name="SUBTITLE"/>
           <p:cNvSpPr txBox="1"/>
           <p:nvPr/>
         </p:nvSpPr>
@@ -17614,7 +17585,7 @@
       </p:sp>
       <p:sp>
         <p:nvSpPr>
-          <p:cNvPr id="365" name="ggplot(mpg, aes(hwy, cty)) +…"/>
+          <p:cNvPr id="364" name="ggplot(mpg, aes(hwy, cty)) +…"/>
           <p:cNvSpPr txBox="1"/>
           <p:nvPr/>
         </p:nvSpPr>
@@ -18323,7 +18294,7 @@
       </p:sp>
       <p:sp>
         <p:nvSpPr>
-          <p:cNvPr id="366" name="SUBTITLE"/>
+          <p:cNvPr id="365" name="SUBTITLE"/>
           <p:cNvSpPr txBox="1"/>
           <p:nvPr/>
         </p:nvSpPr>
@@ -18366,7 +18337,7 @@
       </p:sp>
       <p:sp>
         <p:nvSpPr>
-          <p:cNvPr id="367" name="every(.x, .p, …) Do all element pass a test?…"/>
+          <p:cNvPr id="366" name="every(.x, .p, …) Do all element pass a test?…"/>
           <p:cNvSpPr txBox="1"/>
           <p:nvPr/>
         </p:nvSpPr>
@@ -18497,7 +18468,7 @@
       </p:sp>
       <p:sp>
         <p:nvSpPr>
-          <p:cNvPr id="368" name="every(.x, .p, …) Do all element pass a test?…"/>
+          <p:cNvPr id="367" name="every(.x, .p, …) Do all element pass a test?…"/>
           <p:cNvSpPr txBox="1"/>
           <p:nvPr/>
         </p:nvSpPr>
@@ -18566,7 +18537,7 @@
       </p:sp>
       <p:sp>
         <p:nvSpPr>
-          <p:cNvPr id="369" name="SUBTITLE"/>
+          <p:cNvPr id="368" name="SUBTITLE"/>
           <p:cNvSpPr txBox="1"/>
           <p:nvPr/>
         </p:nvSpPr>
@@ -18609,7 +18580,7 @@
       </p:sp>
       <p:sp>
         <p:nvSpPr>
-          <p:cNvPr id="370" name="every(.x, .p, …) Do all element pass a test?…"/>
+          <p:cNvPr id="369" name="every(.x, .p, …) Do all element pass a test?…"/>
           <p:cNvSpPr txBox="1"/>
           <p:nvPr/>
         </p:nvSpPr>
@@ -18758,7 +18729,7 @@
       </p:sp>
       <p:sp>
         <p:nvSpPr>
-          <p:cNvPr id="371" name="SUBTITLE"/>
+          <p:cNvPr id="370" name="SUBTITLE"/>
           <p:cNvSpPr txBox="1"/>
           <p:nvPr/>
         </p:nvSpPr>
@@ -18801,7 +18772,7 @@
       </p:sp>
       <p:sp>
         <p:nvSpPr>
-          <p:cNvPr id="372" name="every(.x, .p, …) Do all element pass a test?…"/>
+          <p:cNvPr id="371" name="every(.x, .p, …) Do all element pass a test?…"/>
           <p:cNvSpPr txBox="1"/>
           <p:nvPr/>
         </p:nvSpPr>
@@ -18891,7 +18862,7 @@
       </p:sp>
       <p:sp>
         <p:nvSpPr>
-          <p:cNvPr id="373" name="SUBTITLE"/>
+          <p:cNvPr id="372" name="SUBTITLE"/>
           <p:cNvSpPr txBox="1"/>
           <p:nvPr/>
         </p:nvSpPr>
@@ -18934,7 +18905,7 @@
       </p:sp>
       <p:sp>
         <p:nvSpPr>
-          <p:cNvPr id="374" name="SUBTITLE"/>
+          <p:cNvPr id="373" name="SUBTITLE"/>
           <p:cNvSpPr txBox="1"/>
           <p:nvPr/>
         </p:nvSpPr>
@@ -18977,7 +18948,7 @@
       </p:sp>
       <p:sp>
         <p:nvSpPr>
-          <p:cNvPr id="375" name="every(.x, .p, …) Do all element pass a test?…"/>
+          <p:cNvPr id="374" name="every(.x, .p, …) Do all element pass a test?…"/>
           <p:cNvSpPr txBox="1"/>
           <p:nvPr/>
         </p:nvSpPr>
@@ -19283,7 +19254,7 @@
       </p:sp>
       <p:sp>
         <p:nvSpPr>
-          <p:cNvPr id="376" name="SUBTITLE"/>
+          <p:cNvPr id="375" name="SUBTITLE"/>
           <p:cNvSpPr txBox="1"/>
           <p:nvPr/>
         </p:nvSpPr>
@@ -19326,7 +19297,7 @@
       </p:sp>
       <p:sp>
         <p:nvSpPr>
-          <p:cNvPr id="377" name="every(.x, .p, …) Do all element pass a test?…"/>
+          <p:cNvPr id="376" name="every(.x, .p, …) Do all element pass a test?…"/>
           <p:cNvSpPr txBox="1"/>
           <p:nvPr/>
         </p:nvSpPr>
@@ -19495,7 +19466,7 @@
       </p:sp>
       <p:sp>
         <p:nvSpPr>
-          <p:cNvPr id="378" name="every(.x, .p, …) Do all element pass a test?…"/>
+          <p:cNvPr id="377" name="every(.x, .p, …) Do all element pass a test?…"/>
           <p:cNvSpPr txBox="1"/>
           <p:nvPr/>
         </p:nvSpPr>
@@ -19895,7 +19866,7 @@
       </p:sp>
       <p:sp>
         <p:nvSpPr>
-          <p:cNvPr id="379" name="Rectangle 87"/>
+          <p:cNvPr id="378" name="Rectangle 87"/>
           <p:cNvSpPr/>
           <p:nvPr/>
         </p:nvSpPr>
@@ -19950,7 +19921,7 @@
       </p:sp>
       <p:sp>
         <p:nvSpPr>
-          <p:cNvPr id="380" name="Rectangle 88"/>
+          <p:cNvPr id="379" name="Rectangle 88"/>
           <p:cNvSpPr/>
           <p:nvPr/>
         </p:nvSpPr>
@@ -20005,7 +19976,7 @@
       </p:sp>
       <p:sp>
         <p:nvSpPr>
-          <p:cNvPr id="381" name="Rectangle 89"/>
+          <p:cNvPr id="380" name="Rectangle 89"/>
           <p:cNvSpPr/>
           <p:nvPr/>
         </p:nvSpPr>
@@ -20060,7 +20031,7 @@
       </p:sp>
       <p:sp>
         <p:nvSpPr>
-          <p:cNvPr id="382" name="Rectangle 90"/>
+          <p:cNvPr id="381" name="Rectangle 90"/>
           <p:cNvSpPr/>
           <p:nvPr/>
         </p:nvSpPr>
@@ -20115,7 +20086,7 @@
       </p:sp>
       <p:sp>
         <p:nvSpPr>
-          <p:cNvPr id="383" name="Rectangle 91"/>
+          <p:cNvPr id="382" name="Rectangle 91"/>
           <p:cNvSpPr/>
           <p:nvPr/>
         </p:nvSpPr>
@@ -20170,7 +20141,7 @@
       </p:sp>
       <p:sp>
         <p:nvSpPr>
-          <p:cNvPr id="384" name="Rectangle 92"/>
+          <p:cNvPr id="383" name="Rectangle 92"/>
           <p:cNvSpPr/>
           <p:nvPr/>
         </p:nvSpPr>
@@ -20225,7 +20196,7 @@
       </p:sp>
       <p:sp>
         <p:nvSpPr>
-          <p:cNvPr id="385" name="Rectangle 93"/>
+          <p:cNvPr id="384" name="Rectangle 93"/>
           <p:cNvSpPr/>
           <p:nvPr/>
         </p:nvSpPr>
@@ -20280,7 +20251,7 @@
       </p:sp>
       <p:sp>
         <p:nvSpPr>
-          <p:cNvPr id="386" name="Rectangle 94"/>
+          <p:cNvPr id="385" name="Rectangle 94"/>
           <p:cNvSpPr/>
           <p:nvPr/>
         </p:nvSpPr>
@@ -20335,10 +20306,10 @@
       </p:sp>
       <p:cxnSp>
         <p:nvCxnSpPr>
-          <p:cNvPr id="387" name="Straight Arrow Connector 95"/>
+          <p:cNvPr id="386" name="Straight Arrow Connector 95"/>
           <p:cNvCxnSpPr>
-            <a:stCxn id="386" idx="0"/>
-            <a:endCxn id="382" idx="0"/>
+            <a:stCxn id="385" idx="0"/>
+            <a:endCxn id="381" idx="0"/>
           </p:cNvCxnSpPr>
           <p:nvPr/>
         </p:nvCxnSpPr>
@@ -20359,10 +20330,10 @@
       </p:cxnSp>
       <p:cxnSp>
         <p:nvCxnSpPr>
-          <p:cNvPr id="388" name="Straight Arrow Connector 96"/>
+          <p:cNvPr id="387" name="Straight Arrow Connector 96"/>
           <p:cNvCxnSpPr>
-            <a:stCxn id="385" idx="0"/>
-            <a:endCxn id="382" idx="0"/>
+            <a:stCxn id="384" idx="0"/>
+            <a:endCxn id="381" idx="0"/>
           </p:cNvCxnSpPr>
           <p:nvPr/>
         </p:nvCxnSpPr>
@@ -20383,10 +20354,10 @@
       </p:cxnSp>
       <p:cxnSp>
         <p:nvCxnSpPr>
-          <p:cNvPr id="389" name="Straight Arrow Connector 97"/>
+          <p:cNvPr id="388" name="Straight Arrow Connector 97"/>
           <p:cNvCxnSpPr>
-            <a:stCxn id="385" idx="0"/>
-            <a:endCxn id="383" idx="0"/>
+            <a:stCxn id="384" idx="0"/>
+            <a:endCxn id="382" idx="0"/>
           </p:cNvCxnSpPr>
           <p:nvPr/>
         </p:nvCxnSpPr>
@@ -20407,10 +20378,10 @@
       </p:cxnSp>
       <p:cxnSp>
         <p:nvCxnSpPr>
-          <p:cNvPr id="390" name="Straight Arrow Connector 98"/>
+          <p:cNvPr id="389" name="Straight Arrow Connector 98"/>
           <p:cNvCxnSpPr>
-            <a:stCxn id="385" idx="0"/>
-            <a:endCxn id="384" idx="0"/>
+            <a:stCxn id="384" idx="0"/>
+            <a:endCxn id="383" idx="0"/>
           </p:cNvCxnSpPr>
           <p:nvPr/>
         </p:nvCxnSpPr>
@@ -20431,10 +20402,10 @@
       </p:cxnSp>
       <p:cxnSp>
         <p:nvCxnSpPr>
-          <p:cNvPr id="391" name="Straight Arrow Connector 99"/>
+          <p:cNvPr id="390" name="Straight Arrow Connector 99"/>
           <p:cNvCxnSpPr>
-            <a:stCxn id="386" idx="0"/>
-            <a:endCxn id="384" idx="0"/>
+            <a:stCxn id="385" idx="0"/>
+            <a:endCxn id="383" idx="0"/>
           </p:cNvCxnSpPr>
           <p:nvPr/>
         </p:nvCxnSpPr>
@@ -20455,10 +20426,10 @@
       </p:cxnSp>
       <p:cxnSp>
         <p:nvCxnSpPr>
-          <p:cNvPr id="392" name="Straight Arrow Connector 100"/>
+          <p:cNvPr id="391" name="Straight Arrow Connector 100"/>
           <p:cNvCxnSpPr>
-            <a:stCxn id="386" idx="0"/>
-            <a:endCxn id="383" idx="0"/>
+            <a:stCxn id="385" idx="0"/>
+            <a:endCxn id="382" idx="0"/>
           </p:cNvCxnSpPr>
           <p:nvPr/>
         </p:nvCxnSpPr>
@@ -20479,7 +20450,7 @@
       </p:cxnSp>
       <p:sp>
         <p:nvSpPr>
-          <p:cNvPr id="393" name="Rectangle 117"/>
+          <p:cNvPr id="392" name="Rectangle 117"/>
           <p:cNvSpPr/>
           <p:nvPr/>
         </p:nvSpPr>
@@ -20534,7 +20505,7 @@
       </p:sp>
       <p:sp>
         <p:nvSpPr>
-          <p:cNvPr id="394" name="Rectangle 118"/>
+          <p:cNvPr id="393" name="Rectangle 118"/>
           <p:cNvSpPr/>
           <p:nvPr/>
         </p:nvSpPr>
@@ -20589,7 +20560,7 @@
       </p:sp>
       <p:sp>
         <p:nvSpPr>
-          <p:cNvPr id="395" name="Rectangle 119"/>
+          <p:cNvPr id="394" name="Rectangle 119"/>
           <p:cNvSpPr/>
           <p:nvPr/>
         </p:nvSpPr>
@@ -20644,7 +20615,7 @@
       </p:sp>
       <p:sp>
         <p:nvSpPr>
-          <p:cNvPr id="396" name="Rectangle 120"/>
+          <p:cNvPr id="395" name="Rectangle 120"/>
           <p:cNvSpPr/>
           <p:nvPr/>
         </p:nvSpPr>
@@ -20699,7 +20670,7 @@
       </p:sp>
       <p:sp>
         <p:nvSpPr>
-          <p:cNvPr id="397" name="Rectangle 121"/>
+          <p:cNvPr id="396" name="Rectangle 121"/>
           <p:cNvSpPr/>
           <p:nvPr/>
         </p:nvSpPr>
@@ -20754,7 +20725,7 @@
       </p:sp>
       <p:sp>
         <p:nvSpPr>
-          <p:cNvPr id="398" name="Rectangle 122"/>
+          <p:cNvPr id="397" name="Rectangle 122"/>
           <p:cNvSpPr/>
           <p:nvPr/>
         </p:nvSpPr>
@@ -20809,7 +20780,7 @@
       </p:sp>
       <p:sp>
         <p:nvSpPr>
-          <p:cNvPr id="399" name="Rectangle 123"/>
+          <p:cNvPr id="398" name="Rectangle 123"/>
           <p:cNvSpPr/>
           <p:nvPr/>
         </p:nvSpPr>
@@ -20864,7 +20835,7 @@
       </p:sp>
       <p:sp>
         <p:nvSpPr>
-          <p:cNvPr id="400" name="Rectangle 124"/>
+          <p:cNvPr id="399" name="Rectangle 124"/>
           <p:cNvSpPr/>
           <p:nvPr/>
         </p:nvSpPr>
@@ -20919,7 +20890,7 @@
       </p:sp>
       <p:sp>
         <p:nvSpPr>
-          <p:cNvPr id="401" name="Rectangle 86"/>
+          <p:cNvPr id="400" name="Rectangle 86"/>
           <p:cNvSpPr/>
           <p:nvPr/>
         </p:nvSpPr>
@@ -20974,7 +20945,7 @@
       </p:sp>
       <p:sp>
         <p:nvSpPr>
-          <p:cNvPr id="402" name="Rectangle 101"/>
+          <p:cNvPr id="401" name="Rectangle 101"/>
           <p:cNvSpPr/>
           <p:nvPr/>
         </p:nvSpPr>
@@ -21029,7 +21000,7 @@
       </p:sp>
       <p:sp>
         <p:nvSpPr>
-          <p:cNvPr id="403" name="Rectangle 102"/>
+          <p:cNvPr id="402" name="Rectangle 102"/>
           <p:cNvSpPr/>
           <p:nvPr/>
         </p:nvSpPr>
@@ -21084,7 +21055,7 @@
       </p:sp>
       <p:sp>
         <p:nvSpPr>
-          <p:cNvPr id="404" name="Rectangle 103"/>
+          <p:cNvPr id="403" name="Rectangle 103"/>
           <p:cNvSpPr/>
           <p:nvPr/>
         </p:nvSpPr>
@@ -21139,7 +21110,7 @@
       </p:sp>
       <p:sp>
         <p:nvSpPr>
-          <p:cNvPr id="405" name="Rectangle 104"/>
+          <p:cNvPr id="404" name="Rectangle 104"/>
           <p:cNvSpPr/>
           <p:nvPr/>
         </p:nvSpPr>
@@ -21194,7 +21165,7 @@
       </p:sp>
       <p:sp>
         <p:nvSpPr>
-          <p:cNvPr id="406" name="Rectangle 105"/>
+          <p:cNvPr id="405" name="Rectangle 105"/>
           <p:cNvSpPr/>
           <p:nvPr/>
         </p:nvSpPr>
@@ -21249,10 +21220,10 @@
       </p:sp>
       <p:cxnSp>
         <p:nvCxnSpPr>
-          <p:cNvPr id="407" name="Straight Arrow Connector 106"/>
+          <p:cNvPr id="406" name="Straight Arrow Connector 106"/>
           <p:cNvCxnSpPr>
-            <a:stCxn id="403" idx="0"/>
-            <a:endCxn id="406" idx="0"/>
+            <a:stCxn id="402" idx="0"/>
+            <a:endCxn id="405" idx="0"/>
           </p:cNvCxnSpPr>
           <p:nvPr/>
         </p:nvCxnSpPr>
@@ -21273,10 +21244,10 @@
       </p:cxnSp>
       <p:cxnSp>
         <p:nvCxnSpPr>
-          <p:cNvPr id="408" name="Straight Arrow Connector 107"/>
+          <p:cNvPr id="407" name="Straight Arrow Connector 107"/>
           <p:cNvCxnSpPr>
-            <a:stCxn id="401" idx="0"/>
-            <a:endCxn id="405" idx="0"/>
+            <a:stCxn id="400" idx="0"/>
+            <a:endCxn id="404" idx="0"/>
           </p:cNvCxnSpPr>
           <p:nvPr/>
         </p:nvCxnSpPr>
@@ -21297,7 +21268,7 @@
       </p:cxnSp>
       <p:sp>
         <p:nvSpPr>
-          <p:cNvPr id="409" name="Rectangle 109"/>
+          <p:cNvPr id="408" name="Rectangle 109"/>
           <p:cNvSpPr/>
           <p:nvPr/>
         </p:nvSpPr>
@@ -21352,7 +21323,7 @@
       </p:sp>
       <p:sp>
         <p:nvSpPr>
-          <p:cNvPr id="410" name="Rectangle 110"/>
+          <p:cNvPr id="409" name="Rectangle 110"/>
           <p:cNvSpPr/>
           <p:nvPr/>
         </p:nvSpPr>
@@ -21407,7 +21378,7 @@
       </p:sp>
       <p:sp>
         <p:nvSpPr>
-          <p:cNvPr id="411" name="Rectangle 111"/>
+          <p:cNvPr id="410" name="Rectangle 111"/>
           <p:cNvSpPr/>
           <p:nvPr/>
         </p:nvSpPr>
@@ -21462,7 +21433,7 @@
       </p:sp>
       <p:sp>
         <p:nvSpPr>
-          <p:cNvPr id="412" name="Rectangle 112"/>
+          <p:cNvPr id="411" name="Rectangle 112"/>
           <p:cNvSpPr/>
           <p:nvPr/>
         </p:nvSpPr>
@@ -21517,7 +21488,7 @@
       </p:sp>
       <p:sp>
         <p:nvSpPr>
-          <p:cNvPr id="413" name="Rectangle 113"/>
+          <p:cNvPr id="412" name="Rectangle 113"/>
           <p:cNvSpPr/>
           <p:nvPr/>
         </p:nvSpPr>
@@ -21572,7 +21543,7 @@
       </p:sp>
       <p:sp>
         <p:nvSpPr>
-          <p:cNvPr id="414" name="Rectangle 114"/>
+          <p:cNvPr id="413" name="Rectangle 114"/>
           <p:cNvSpPr/>
           <p:nvPr/>
         </p:nvSpPr>
@@ -21627,7 +21598,7 @@
       </p:sp>
       <p:sp>
         <p:nvSpPr>
-          <p:cNvPr id="415" name="Rectangle 115"/>
+          <p:cNvPr id="414" name="Rectangle 115"/>
           <p:cNvSpPr/>
           <p:nvPr/>
         </p:nvSpPr>
@@ -21682,7 +21653,7 @@
       </p:sp>
       <p:sp>
         <p:nvSpPr>
-          <p:cNvPr id="416" name="Rectangle 116"/>
+          <p:cNvPr id="415" name="Rectangle 116"/>
           <p:cNvSpPr/>
           <p:nvPr/>
         </p:nvSpPr>
@@ -21737,7 +21708,7 @@
       </p:sp>
       <p:sp>
         <p:nvSpPr>
-          <p:cNvPr id="417" name="Rectangle 140"/>
+          <p:cNvPr id="416" name="Rectangle 140"/>
           <p:cNvSpPr/>
           <p:nvPr/>
         </p:nvSpPr>
@@ -21792,7 +21763,7 @@
       </p:sp>
       <p:sp>
         <p:nvSpPr>
-          <p:cNvPr id="418" name="Rectangle 145"/>
+          <p:cNvPr id="417" name="Rectangle 145"/>
           <p:cNvSpPr/>
           <p:nvPr/>
         </p:nvSpPr>
@@ -21847,7 +21818,7 @@
       </p:sp>
       <p:sp>
         <p:nvSpPr>
-          <p:cNvPr id="419" name="Rectangle 146"/>
+          <p:cNvPr id="418" name="Rectangle 146"/>
           <p:cNvSpPr/>
           <p:nvPr/>
         </p:nvSpPr>
@@ -21902,7 +21873,7 @@
       </p:sp>
       <p:sp>
         <p:nvSpPr>
-          <p:cNvPr id="420" name="Rectangle 147"/>
+          <p:cNvPr id="419" name="Rectangle 147"/>
           <p:cNvSpPr/>
           <p:nvPr/>
         </p:nvSpPr>
@@ -21957,7 +21928,7 @@
       </p:sp>
       <p:sp>
         <p:nvSpPr>
-          <p:cNvPr id="421" name="Rectangle 148"/>
+          <p:cNvPr id="420" name="Rectangle 148"/>
           <p:cNvSpPr/>
           <p:nvPr/>
         </p:nvSpPr>
@@ -22012,7 +21983,7 @@
       </p:sp>
       <p:sp>
         <p:nvSpPr>
-          <p:cNvPr id="422" name="Rectangle 150"/>
+          <p:cNvPr id="421" name="Rectangle 150"/>
           <p:cNvSpPr/>
           <p:nvPr/>
         </p:nvSpPr>
@@ -22067,7 +22038,7 @@
       </p:sp>
       <p:sp>
         <p:nvSpPr>
-          <p:cNvPr id="423" name="Rectangle 151"/>
+          <p:cNvPr id="422" name="Rectangle 151"/>
           <p:cNvSpPr/>
           <p:nvPr/>
         </p:nvSpPr>
@@ -22122,7 +22093,7 @@
       </p:sp>
       <p:sp>
         <p:nvSpPr>
-          <p:cNvPr id="424" name="Rectangle 152"/>
+          <p:cNvPr id="423" name="Rectangle 152"/>
           <p:cNvSpPr/>
           <p:nvPr/>
         </p:nvSpPr>
@@ -22177,7 +22148,7 @@
       </p:sp>
       <p:sp>
         <p:nvSpPr>
-          <p:cNvPr id="425" name="Rectangle 153"/>
+          <p:cNvPr id="424" name="Rectangle 153"/>
           <p:cNvSpPr/>
           <p:nvPr/>
         </p:nvSpPr>
@@ -22232,7 +22203,7 @@
       </p:sp>
       <p:sp>
         <p:nvSpPr>
-          <p:cNvPr id="426" name="Rectangle 154"/>
+          <p:cNvPr id="425" name="Rectangle 154"/>
           <p:cNvSpPr/>
           <p:nvPr/>
         </p:nvSpPr>
@@ -22287,7 +22258,7 @@
       </p:sp>
       <p:sp>
         <p:nvSpPr>
-          <p:cNvPr id="427" name="Rectangle 155"/>
+          <p:cNvPr id="426" name="Rectangle 155"/>
           <p:cNvSpPr/>
           <p:nvPr/>
         </p:nvSpPr>
@@ -22342,7 +22313,7 @@
       </p:sp>
       <p:sp>
         <p:nvSpPr>
-          <p:cNvPr id="428" name="Rectangle 156"/>
+          <p:cNvPr id="427" name="Rectangle 156"/>
           <p:cNvSpPr/>
           <p:nvPr/>
         </p:nvSpPr>
@@ -22397,7 +22368,7 @@
       </p:sp>
       <p:grpSp>
         <p:nvGrpSpPr>
-          <p:cNvPr id="431" name="Rectangle 165"/>
+          <p:cNvPr id="430" name="Rectangle 165"/>
           <p:cNvGrpSpPr/>
           <p:nvPr/>
         </p:nvGrpSpPr>
@@ -22411,7 +22382,7 @@
         </p:grpSpPr>
         <p:sp>
           <p:nvSpPr>
-            <p:cNvPr id="429" name="Square"/>
+            <p:cNvPr id="428" name="Square"/>
             <p:cNvSpPr/>
             <p:nvPr/>
           </p:nvSpPr>
@@ -22466,7 +22437,7 @@
         </p:sp>
         <p:sp>
           <p:nvSpPr>
-            <p:cNvPr id="430" name="n"/>
+            <p:cNvPr id="429" name="n"/>
             <p:cNvSpPr txBox="1"/>
             <p:nvPr/>
           </p:nvSpPr>
@@ -22524,7 +22495,7 @@
       </p:grpSp>
       <p:sp>
         <p:nvSpPr>
-          <p:cNvPr id="432" name="Rectangle 167"/>
+          <p:cNvPr id="431" name="Rectangle 167"/>
           <p:cNvSpPr/>
           <p:nvPr/>
         </p:nvSpPr>
@@ -22579,7 +22550,7 @@
       </p:sp>
       <p:sp>
         <p:nvSpPr>
-          <p:cNvPr id="433" name="Rectangle 166"/>
+          <p:cNvPr id="432" name="Rectangle 166"/>
           <p:cNvSpPr/>
           <p:nvPr/>
         </p:nvSpPr>
@@ -22634,7 +22605,7 @@
       </p:sp>
       <p:sp>
         <p:nvSpPr>
-          <p:cNvPr id="434" name="Rectangle 168"/>
+          <p:cNvPr id="433" name="Rectangle 168"/>
           <p:cNvSpPr/>
           <p:nvPr/>
         </p:nvSpPr>
@@ -22689,7 +22660,7 @@
       </p:sp>
       <p:grpSp>
         <p:nvGrpSpPr>
-          <p:cNvPr id="437" name="Rectangle 169"/>
+          <p:cNvPr id="436" name="Rectangle 169"/>
           <p:cNvGrpSpPr/>
           <p:nvPr/>
         </p:nvGrpSpPr>
@@ -22703,7 +22674,7 @@
         </p:grpSpPr>
         <p:sp>
           <p:nvSpPr>
-            <p:cNvPr id="435" name="Square"/>
+            <p:cNvPr id="434" name="Square"/>
             <p:cNvSpPr/>
             <p:nvPr/>
           </p:nvSpPr>
@@ -22758,7 +22729,7 @@
         </p:sp>
         <p:sp>
           <p:nvSpPr>
-            <p:cNvPr id="436" name="x"/>
+            <p:cNvPr id="435" name="x"/>
             <p:cNvSpPr txBox="1"/>
             <p:nvPr/>
           </p:nvSpPr>
@@ -22816,7 +22787,7 @@
       </p:grpSp>
       <p:grpSp>
         <p:nvGrpSpPr>
-          <p:cNvPr id="440" name="Rectangle 170"/>
+          <p:cNvPr id="439" name="Rectangle 170"/>
           <p:cNvGrpSpPr/>
           <p:nvPr/>
         </p:nvGrpSpPr>
@@ -22830,7 +22801,7 @@
         </p:grpSpPr>
         <p:sp>
           <p:nvSpPr>
-            <p:cNvPr id="438" name="Square"/>
+            <p:cNvPr id="437" name="Square"/>
             <p:cNvSpPr/>
             <p:nvPr/>
           </p:nvSpPr>
@@ -22888,7 +22859,7 @@
         </p:sp>
         <p:sp>
           <p:nvSpPr>
-            <p:cNvPr id="439" name="f(x)"/>
+            <p:cNvPr id="438" name="f(x)"/>
             <p:cNvSpPr txBox="1"/>
             <p:nvPr/>
           </p:nvSpPr>
@@ -22946,7 +22917,7 @@
       </p:grpSp>
       <p:grpSp>
         <p:nvGrpSpPr>
-          <p:cNvPr id="443" name="Rectangle 173"/>
+          <p:cNvPr id="442" name="Rectangle 173"/>
           <p:cNvGrpSpPr/>
           <p:nvPr/>
         </p:nvGrpSpPr>
@@ -22960,7 +22931,7 @@
         </p:grpSpPr>
         <p:sp>
           <p:nvSpPr>
-            <p:cNvPr id="441" name="Square"/>
+            <p:cNvPr id="440" name="Square"/>
             <p:cNvSpPr/>
             <p:nvPr/>
           </p:nvSpPr>
@@ -23018,7 +22989,7 @@
         </p:sp>
         <p:sp>
           <p:nvSpPr>
-            <p:cNvPr id="442" name="L2"/>
+            <p:cNvPr id="441" name="L2"/>
             <p:cNvSpPr txBox="1"/>
             <p:nvPr/>
           </p:nvSpPr>
@@ -23076,7 +23047,7 @@
       </p:grpSp>
       <p:grpSp>
         <p:nvGrpSpPr>
-          <p:cNvPr id="446" name="Rectangle 176"/>
+          <p:cNvPr id="445" name="Rectangle 176"/>
           <p:cNvGrpSpPr/>
           <p:nvPr/>
         </p:nvGrpSpPr>
@@ -23090,7 +23061,7 @@
         </p:grpSpPr>
         <p:sp>
           <p:nvSpPr>
-            <p:cNvPr id="444" name="Square"/>
+            <p:cNvPr id="443" name="Square"/>
             <p:cNvSpPr/>
             <p:nvPr/>
           </p:nvSpPr>
@@ -23148,7 +23119,7 @@
         </p:sp>
         <p:sp>
           <p:nvSpPr>
-            <p:cNvPr id="445" name="L1"/>
+            <p:cNvPr id="444" name="L1"/>
             <p:cNvSpPr txBox="1"/>
             <p:nvPr/>
           </p:nvSpPr>
@@ -23206,7 +23177,7 @@
       </p:grpSp>
       <p:sp>
         <p:nvSpPr>
-          <p:cNvPr id="447" name="Rectangle 177"/>
+          <p:cNvPr id="446" name="Rectangle 177"/>
           <p:cNvSpPr/>
           <p:nvPr/>
         </p:nvSpPr>
@@ -23261,7 +23232,7 @@
       </p:sp>
       <p:sp>
         <p:nvSpPr>
-          <p:cNvPr id="448" name="Rectangle 178"/>
+          <p:cNvPr id="447" name="Rectangle 178"/>
           <p:cNvSpPr/>
           <p:nvPr/>
         </p:nvSpPr>
@@ -23316,7 +23287,7 @@
       </p:sp>
       <p:sp>
         <p:nvSpPr>
-          <p:cNvPr id="449" name="Rectangle 179"/>
+          <p:cNvPr id="448" name="Rectangle 179"/>
           <p:cNvSpPr/>
           <p:nvPr/>
         </p:nvSpPr>
@@ -23371,7 +23342,7 @@
       </p:sp>
       <p:sp>
         <p:nvSpPr>
-          <p:cNvPr id="450" name="Rectangle 180"/>
+          <p:cNvPr id="449" name="Rectangle 180"/>
           <p:cNvSpPr/>
           <p:nvPr/>
         </p:nvSpPr>
@@ -23426,7 +23397,7 @@
       </p:sp>
       <p:sp>
         <p:nvSpPr>
-          <p:cNvPr id="451" name="Rectangle 181"/>
+          <p:cNvPr id="450" name="Rectangle 181"/>
           <p:cNvSpPr/>
           <p:nvPr/>
         </p:nvSpPr>
@@ -23481,7 +23452,7 @@
       </p:sp>
       <p:sp>
         <p:nvSpPr>
-          <p:cNvPr id="452" name="Rectangle 182"/>
+          <p:cNvPr id="451" name="Rectangle 182"/>
           <p:cNvSpPr/>
           <p:nvPr/>
         </p:nvSpPr>
@@ -23536,7 +23507,7 @@
       </p:sp>
       <p:sp>
         <p:nvSpPr>
-          <p:cNvPr id="453" name="Rectangle 186"/>
+          <p:cNvPr id="452" name="Rectangle 186"/>
           <p:cNvSpPr/>
           <p:nvPr/>
         </p:nvSpPr>
@@ -23591,7 +23562,7 @@
       </p:sp>
       <p:sp>
         <p:nvSpPr>
-          <p:cNvPr id="454" name="Rectangle 190"/>
+          <p:cNvPr id="453" name="Rectangle 190"/>
           <p:cNvSpPr/>
           <p:nvPr/>
         </p:nvSpPr>
@@ -23646,7 +23617,7 @@
       </p:sp>
       <p:sp>
         <p:nvSpPr>
-          <p:cNvPr id="455" name="Freeform: Shape 8"/>
+          <p:cNvPr id="454" name="Freeform: Shape 8"/>
           <p:cNvSpPr/>
           <p:nvPr/>
         </p:nvSpPr>
@@ -23713,7 +23684,7 @@
       </p:sp>
       <p:sp>
         <p:nvSpPr>
-          <p:cNvPr id="456" name="Freeform: Shape 14"/>
+          <p:cNvPr id="455" name="Freeform: Shape 14"/>
           <p:cNvSpPr/>
           <p:nvPr/>
         </p:nvSpPr>
@@ -23784,7 +23755,7 @@
       </p:sp>
       <p:sp>
         <p:nvSpPr>
-          <p:cNvPr id="457" name="Rectangle 3"/>
+          <p:cNvPr id="456" name="Rectangle 3"/>
           <p:cNvSpPr txBox="1"/>
           <p:nvPr/>
         </p:nvSpPr>
@@ -23829,7 +23800,7 @@
       </p:sp>
       <p:sp>
         <p:nvSpPr>
-          <p:cNvPr id="458" name="SUBTITLE"/>
+          <p:cNvPr id="457" name="SUBTITLE"/>
           <p:cNvSpPr txBox="1"/>
           <p:nvPr/>
         </p:nvSpPr>
@@ -23872,7 +23843,7 @@
       </p:sp>
       <p:sp>
         <p:nvSpPr>
-          <p:cNvPr id="459" name="Shape"/>
+          <p:cNvPr id="458" name="Shape"/>
           <p:cNvSpPr/>
           <p:nvPr/>
         </p:nvSpPr>
@@ -23983,7 +23954,7 @@
       </p:sp>
       <p:sp>
         <p:nvSpPr>
-          <p:cNvPr id="460" name="See ?install_keras for GPU instructions"/>
+          <p:cNvPr id="459" name="See ?install_keras for GPU instructions"/>
           <p:cNvSpPr txBox="1"/>
           <p:nvPr/>
         </p:nvSpPr>
@@ -24037,7 +24008,7 @@
       </p:sp>
       <p:sp>
         <p:nvSpPr>
-          <p:cNvPr id="461" name="SUBTITLE"/>
+          <p:cNvPr id="460" name="SUBTITLE"/>
           <p:cNvSpPr txBox="1"/>
           <p:nvPr/>
         </p:nvSpPr>
@@ -24078,38 +24049,9 @@
           </a:p>
         </p:txBody>
       </p:sp>
-      <p:pic>
-        <p:nvPicPr>
-          <p:cNvPr id="462" name="Picture 2" descr="Picture 2"/>
-          <p:cNvPicPr>
-            <a:picLocks noChangeAspect="1"/>
-          </p:cNvPicPr>
-          <p:nvPr/>
-        </p:nvPicPr>
-        <p:blipFill>
-          <a:blip r:embed="rId7">
-            <a:extLst/>
-          </a:blip>
-          <a:stretch>
-            <a:fillRect/>
-          </a:stretch>
-        </p:blipFill>
-        <p:spPr>
-          <a:xfrm>
-            <a:off x="12503788" y="3681669"/>
-            <a:ext cx="1114089" cy="277285"/>
-          </a:xfrm>
-          <a:prstGeom prst="rect">
-            <a:avLst/>
-          </a:prstGeom>
-          <a:ln w="12700">
-            <a:miter lim="400000"/>
-          </a:ln>
-        </p:spPr>
-      </p:pic>
       <p:sp>
         <p:nvSpPr>
-          <p:cNvPr id="463" name="Rectangle 133"/>
+          <p:cNvPr id="461" name="Rectangle 133"/>
           <p:cNvSpPr txBox="1"/>
           <p:nvPr/>
         </p:nvSpPr>
@@ -24154,7 +24096,7 @@
                     <a:srgbClr val="0000FF"/>
                   </a:solidFill>
                 </a:uFill>
-                <a:hlinkClick r:id="rId8" invalidUrl="" action="" tgtFrame="" tooltip="" history="1" highlightClick="0" endSnd="0"/>
+                <a:hlinkClick r:id="rId6" invalidUrl="" action="" tgtFrame="" tooltip="" history="1" highlightClick="0" endSnd="0"/>
               </a:rPr>
               <a:t>https://keras.rstudio.com</a:t>
             </a:r>
@@ -24166,7 +24108,7 @@
       </p:sp>
       <p:sp>
         <p:nvSpPr>
-          <p:cNvPr id="464" name="Rectangle 135"/>
+          <p:cNvPr id="462" name="Rectangle 135"/>
           <p:cNvSpPr txBox="1"/>
           <p:nvPr/>
         </p:nvSpPr>
@@ -24211,7 +24153,7 @@
                     <a:srgbClr val="0000FF"/>
                   </a:solidFill>
                 </a:uFill>
-                <a:hlinkClick r:id="rId9" invalidUrl="" action="" tgtFrame="" tooltip="" history="1" highlightClick="0" endSnd="0"/>
+                <a:hlinkClick r:id="rId7" invalidUrl="" action="" tgtFrame="" tooltip="" history="1" highlightClick="0" endSnd="0"/>
               </a:rPr>
               <a:t>https://www.manning.com/books/deep-learning-with-r</a:t>
             </a:r>
@@ -24223,7 +24165,7 @@
       </p:sp>
       <p:sp>
         <p:nvSpPr>
-          <p:cNvPr id="465" name="Shape"/>
+          <p:cNvPr id="463" name="Shape"/>
           <p:cNvSpPr/>
           <p:nvPr/>
         </p:nvSpPr>
@@ -24340,7 +24282,7 @@
       </p:sp>
       <p:sp>
         <p:nvSpPr>
-          <p:cNvPr id="466" name="The “Hello, World!” of deep learning"/>
+          <p:cNvPr id="464" name="The “Hello, World!” of deep learning"/>
           <p:cNvSpPr txBox="1"/>
           <p:nvPr/>
         </p:nvSpPr>
@@ -24392,6 +24334,64 @@
           </a:p>
         </p:txBody>
       </p:sp>
+      <p:pic>
+        <p:nvPicPr>
+          <p:cNvPr id="465" name="pasted-image.pdf" descr="pasted-image.pdf"/>
+          <p:cNvPicPr>
+            <a:picLocks noChangeAspect="1"/>
+          </p:cNvPicPr>
+          <p:nvPr/>
+        </p:nvPicPr>
+        <p:blipFill>
+          <a:blip r:embed="rId8">
+            <a:extLst/>
+          </a:blip>
+          <a:stretch>
+            <a:fillRect/>
+          </a:stretch>
+        </p:blipFill>
+        <p:spPr>
+          <a:xfrm>
+            <a:off x="238822" y="9978473"/>
+            <a:ext cx="1754523" cy="616479"/>
+          </a:xfrm>
+          <a:prstGeom prst="rect">
+            <a:avLst/>
+          </a:prstGeom>
+          <a:ln w="12700">
+            <a:miter lim="400000"/>
+          </a:ln>
+        </p:spPr>
+      </p:pic>
+      <p:pic>
+        <p:nvPicPr>
+          <p:cNvPr id="466" name="Picture 2" descr="Picture 2"/>
+          <p:cNvPicPr>
+            <a:picLocks noChangeAspect="1"/>
+          </p:cNvPicPr>
+          <p:nvPr/>
+        </p:nvPicPr>
+        <p:blipFill>
+          <a:blip r:embed="rId9">
+            <a:extLst/>
+          </a:blip>
+          <a:stretch>
+            <a:fillRect/>
+          </a:stretch>
+        </p:blipFill>
+        <p:spPr>
+          <a:xfrm>
+            <a:off x="12503788" y="3681669"/>
+            <a:ext cx="1114089" cy="277285"/>
+          </a:xfrm>
+          <a:prstGeom prst="rect">
+            <a:avLst/>
+          </a:prstGeom>
+          <a:ln w="12700">
+            <a:miter lim="400000"/>
+          </a:ln>
+        </p:spPr>
+      </p:pic>
       <p:grpSp>
         <p:nvGrpSpPr>
           <p:cNvPr id="473" name="Group 157"/>
@@ -25702,38 +25702,9 @@
           </a:p>
         </p:txBody>
       </p:sp>
-      <p:pic>
-        <p:nvPicPr>
-          <p:cNvPr id="498" name="pasted-image.pdf" descr="pasted-image.pdf"/>
-          <p:cNvPicPr>
-            <a:picLocks noChangeAspect="1"/>
-          </p:cNvPicPr>
-          <p:nvPr/>
-        </p:nvPicPr>
-        <p:blipFill>
-          <a:blip r:embed="rId2">
-            <a:extLst/>
-          </a:blip>
-          <a:stretch>
-            <a:fillRect/>
-          </a:stretch>
-        </p:blipFill>
-        <p:spPr>
-          <a:xfrm>
-            <a:off x="238822" y="9978473"/>
-            <a:ext cx="1754523" cy="616479"/>
-          </a:xfrm>
-          <a:prstGeom prst="rect">
-            <a:avLst/>
-          </a:prstGeom>
-          <a:ln w="12700">
-            <a:miter lim="400000"/>
-          </a:ln>
-        </p:spPr>
-      </p:pic>
       <p:sp>
         <p:nvSpPr>
-          <p:cNvPr id="499" name="Rectangle"/>
+          <p:cNvPr id="498" name="Rectangle"/>
           <p:cNvSpPr/>
           <p:nvPr/>
         </p:nvSpPr>
@@ -25790,7 +25761,7 @@
       </p:sp>
       <p:sp>
         <p:nvSpPr>
-          <p:cNvPr id="500" name="Rectangle"/>
+          <p:cNvPr id="499" name="Rectangle"/>
           <p:cNvSpPr/>
           <p:nvPr/>
         </p:nvSpPr>
@@ -25847,7 +25818,7 @@
       </p:sp>
       <p:sp>
         <p:nvSpPr>
-          <p:cNvPr id="501" name="SUBTITLE"/>
+          <p:cNvPr id="500" name="SUBTITLE"/>
           <p:cNvSpPr txBox="1"/>
           <p:nvPr/>
         </p:nvSpPr>
@@ -25890,7 +25861,7 @@
       </p:sp>
       <p:sp>
         <p:nvSpPr>
-          <p:cNvPr id="502" name="SUBTITLE"/>
+          <p:cNvPr id="501" name="SUBTITLE"/>
           <p:cNvSpPr txBox="1"/>
           <p:nvPr/>
         </p:nvSpPr>
@@ -25933,7 +25904,7 @@
       </p:sp>
       <p:sp>
         <p:nvSpPr>
-          <p:cNvPr id="503" name="every(.x, .p, …) Do all element pass a test?…"/>
+          <p:cNvPr id="502" name="every(.x, .p, …) Do all element pass a test?…"/>
           <p:cNvSpPr txBox="1"/>
           <p:nvPr/>
         </p:nvSpPr>
@@ -26403,7 +26374,7 @@
       </p:sp>
       <p:sp>
         <p:nvSpPr>
-          <p:cNvPr id="504" name="Rectangle 30"/>
+          <p:cNvPr id="503" name="Rectangle 30"/>
           <p:cNvSpPr/>
           <p:nvPr/>
         </p:nvSpPr>
@@ -26458,7 +26429,7 @@
       </p:sp>
       <p:sp>
         <p:nvSpPr>
-          <p:cNvPr id="505" name="Rectangle 31"/>
+          <p:cNvPr id="504" name="Rectangle 31"/>
           <p:cNvSpPr/>
           <p:nvPr/>
         </p:nvSpPr>
@@ -26513,7 +26484,7 @@
       </p:sp>
       <p:sp>
         <p:nvSpPr>
-          <p:cNvPr id="506" name="Rectangle 32"/>
+          <p:cNvPr id="505" name="Rectangle 32"/>
           <p:cNvSpPr/>
           <p:nvPr/>
         </p:nvSpPr>
@@ -26568,7 +26539,7 @@
       </p:sp>
       <p:sp>
         <p:nvSpPr>
-          <p:cNvPr id="507" name="Rectangle 33"/>
+          <p:cNvPr id="506" name="Rectangle 33"/>
           <p:cNvSpPr/>
           <p:nvPr/>
         </p:nvSpPr>
@@ -26623,7 +26594,7 @@
       </p:sp>
       <p:sp>
         <p:nvSpPr>
-          <p:cNvPr id="508" name="Rectangle 39"/>
+          <p:cNvPr id="507" name="Rectangle 39"/>
           <p:cNvSpPr/>
           <p:nvPr/>
         </p:nvSpPr>
@@ -26678,7 +26649,7 @@
       </p:sp>
       <p:sp>
         <p:nvSpPr>
-          <p:cNvPr id="509" name="Rectangle 40"/>
+          <p:cNvPr id="508" name="Rectangle 40"/>
           <p:cNvSpPr/>
           <p:nvPr/>
         </p:nvSpPr>
@@ -26733,7 +26704,7 @@
       </p:sp>
       <p:sp>
         <p:nvSpPr>
-          <p:cNvPr id="510" name="Rectangle 41"/>
+          <p:cNvPr id="509" name="Rectangle 41"/>
           <p:cNvSpPr/>
           <p:nvPr/>
         </p:nvSpPr>
@@ -26788,7 +26759,7 @@
       </p:sp>
       <p:sp>
         <p:nvSpPr>
-          <p:cNvPr id="511" name="Rectangle 42"/>
+          <p:cNvPr id="510" name="Rectangle 42"/>
           <p:cNvSpPr/>
           <p:nvPr/>
         </p:nvSpPr>
@@ -26843,7 +26814,7 @@
       </p:sp>
       <p:sp>
         <p:nvSpPr>
-          <p:cNvPr id="512" name="Isosceles Triangle 2"/>
+          <p:cNvPr id="511" name="Isosceles Triangle 2"/>
           <p:cNvSpPr/>
           <p:nvPr/>
         </p:nvSpPr>
@@ -26895,7 +26866,7 @@
       </p:sp>
       <p:grpSp>
         <p:nvGrpSpPr>
-          <p:cNvPr id="527" name="Group 7"/>
+          <p:cNvPr id="526" name="Group 7"/>
           <p:cNvGrpSpPr/>
           <p:nvPr/>
         </p:nvGrpSpPr>
@@ -26909,7 +26880,7 @@
         </p:grpSpPr>
         <p:sp>
           <p:nvSpPr>
-            <p:cNvPr id="513" name="Rectangle 34"/>
+            <p:cNvPr id="512" name="Rectangle 34"/>
             <p:cNvSpPr/>
             <p:nvPr/>
           </p:nvSpPr>
@@ -26967,7 +26938,7 @@
         </p:sp>
         <p:sp>
           <p:nvSpPr>
-            <p:cNvPr id="514" name="Rectangle 35"/>
+            <p:cNvPr id="513" name="Rectangle 35"/>
             <p:cNvSpPr/>
             <p:nvPr/>
           </p:nvSpPr>
@@ -27025,7 +26996,7 @@
         </p:sp>
         <p:sp>
           <p:nvSpPr>
-            <p:cNvPr id="515" name="Rectangle 36"/>
+            <p:cNvPr id="514" name="Rectangle 36"/>
             <p:cNvSpPr/>
             <p:nvPr/>
           </p:nvSpPr>
@@ -27083,7 +27054,7 @@
         </p:sp>
         <p:sp>
           <p:nvSpPr>
-            <p:cNvPr id="516" name="Rectangle 37"/>
+            <p:cNvPr id="515" name="Rectangle 37"/>
             <p:cNvSpPr/>
             <p:nvPr/>
           </p:nvSpPr>
@@ -27141,7 +27112,7 @@
         </p:sp>
         <p:sp>
           <p:nvSpPr>
-            <p:cNvPr id="517" name="Rectangle 45"/>
+            <p:cNvPr id="516" name="Rectangle 45"/>
             <p:cNvSpPr/>
             <p:nvPr/>
           </p:nvSpPr>
@@ -27199,7 +27170,7 @@
         </p:sp>
         <p:sp>
           <p:nvSpPr>
-            <p:cNvPr id="518" name="Rectangle 46"/>
+            <p:cNvPr id="517" name="Rectangle 46"/>
             <p:cNvSpPr/>
             <p:nvPr/>
           </p:nvSpPr>
@@ -27257,7 +27228,7 @@
         </p:sp>
         <p:sp>
           <p:nvSpPr>
-            <p:cNvPr id="519" name="Rectangle 47"/>
+            <p:cNvPr id="518" name="Rectangle 47"/>
             <p:cNvSpPr/>
             <p:nvPr/>
           </p:nvSpPr>
@@ -27315,7 +27286,7 @@
         </p:sp>
         <p:sp>
           <p:nvSpPr>
-            <p:cNvPr id="520" name="Rectangle 48"/>
+            <p:cNvPr id="519" name="Rectangle 48"/>
             <p:cNvSpPr/>
             <p:nvPr/>
           </p:nvSpPr>
@@ -27373,7 +27344,7 @@
         </p:sp>
         <p:sp>
           <p:nvSpPr>
-            <p:cNvPr id="521" name="Rectangle 49"/>
+            <p:cNvPr id="520" name="Rectangle 49"/>
             <p:cNvSpPr/>
             <p:nvPr/>
           </p:nvSpPr>
@@ -27431,7 +27402,7 @@
         </p:sp>
         <p:sp>
           <p:nvSpPr>
-            <p:cNvPr id="522" name="Rectangle 50"/>
+            <p:cNvPr id="521" name="Rectangle 50"/>
             <p:cNvSpPr/>
             <p:nvPr/>
           </p:nvSpPr>
@@ -27489,7 +27460,7 @@
         </p:sp>
         <p:sp>
           <p:nvSpPr>
-            <p:cNvPr id="523" name="Rectangle 51"/>
+            <p:cNvPr id="522" name="Rectangle 51"/>
             <p:cNvSpPr/>
             <p:nvPr/>
           </p:nvSpPr>
@@ -27547,7 +27518,7 @@
         </p:sp>
         <p:sp>
           <p:nvSpPr>
-            <p:cNvPr id="524" name="Rectangle 52"/>
+            <p:cNvPr id="523" name="Rectangle 52"/>
             <p:cNvSpPr/>
             <p:nvPr/>
           </p:nvSpPr>
@@ -27605,7 +27576,7 @@
         </p:sp>
         <p:sp>
           <p:nvSpPr>
-            <p:cNvPr id="525" name="Rectangle 53"/>
+            <p:cNvPr id="524" name="Rectangle 53"/>
             <p:cNvSpPr/>
             <p:nvPr/>
           </p:nvSpPr>
@@ -27663,7 +27634,7 @@
         </p:sp>
         <p:sp>
           <p:nvSpPr>
-            <p:cNvPr id="526" name="Isosceles Triangle 54"/>
+            <p:cNvPr id="525" name="Isosceles Triangle 54"/>
             <p:cNvSpPr/>
             <p:nvPr/>
           </p:nvSpPr>
@@ -27719,7 +27690,7 @@
       </p:grpSp>
       <p:sp>
         <p:nvSpPr>
-          <p:cNvPr id="528" name="Isosceles Triangle 68"/>
+          <p:cNvPr id="527" name="Isosceles Triangle 68"/>
           <p:cNvSpPr/>
           <p:nvPr/>
         </p:nvSpPr>
@@ -27771,7 +27742,7 @@
       </p:sp>
       <p:grpSp>
         <p:nvGrpSpPr>
-          <p:cNvPr id="533" name="Cube 3"/>
+          <p:cNvPr id="532" name="Cube 3"/>
           <p:cNvGrpSpPr/>
           <p:nvPr/>
         </p:nvGrpSpPr>
@@ -27785,7 +27756,7 @@
         </p:grpSpPr>
         <p:sp>
           <p:nvSpPr>
-            <p:cNvPr id="529" name="Shape"/>
+            <p:cNvPr id="528" name="Shape"/>
             <p:cNvSpPr/>
             <p:nvPr/>
           </p:nvSpPr>
@@ -27874,7 +27845,7 @@
         </p:sp>
         <p:sp>
           <p:nvSpPr>
-            <p:cNvPr id="530" name="Shape"/>
+            <p:cNvPr id="529" name="Shape"/>
             <p:cNvSpPr/>
             <p:nvPr/>
           </p:nvSpPr>
@@ -27959,7 +27930,7 @@
         </p:sp>
         <p:sp>
           <p:nvSpPr>
-            <p:cNvPr id="531" name="Shape"/>
+            <p:cNvPr id="530" name="Shape"/>
             <p:cNvSpPr/>
             <p:nvPr/>
           </p:nvSpPr>
@@ -28044,7 +28015,7 @@
         </p:sp>
         <p:sp>
           <p:nvSpPr>
-            <p:cNvPr id="532" name="Shape"/>
+            <p:cNvPr id="531" name="Shape"/>
             <p:cNvSpPr/>
             <p:nvPr/>
           </p:nvSpPr>
@@ -28150,7 +28121,7 @@
       </p:grpSp>
       <p:grpSp>
         <p:nvGrpSpPr>
-          <p:cNvPr id="538" name="Cube 70"/>
+          <p:cNvPr id="537" name="Cube 70"/>
           <p:cNvGrpSpPr/>
           <p:nvPr/>
         </p:nvGrpSpPr>
@@ -28164,7 +28135,7 @@
         </p:grpSpPr>
         <p:sp>
           <p:nvSpPr>
-            <p:cNvPr id="534" name="Shape"/>
+            <p:cNvPr id="533" name="Shape"/>
             <p:cNvSpPr/>
             <p:nvPr/>
           </p:nvSpPr>
@@ -28253,7 +28224,7 @@
         </p:sp>
         <p:sp>
           <p:nvSpPr>
-            <p:cNvPr id="535" name="Shape"/>
+            <p:cNvPr id="534" name="Shape"/>
             <p:cNvSpPr/>
             <p:nvPr/>
           </p:nvSpPr>
@@ -28338,7 +28309,7 @@
         </p:sp>
         <p:sp>
           <p:nvSpPr>
-            <p:cNvPr id="536" name="Shape"/>
+            <p:cNvPr id="535" name="Shape"/>
             <p:cNvSpPr/>
             <p:nvPr/>
           </p:nvSpPr>
@@ -28423,7 +28394,7 @@
         </p:sp>
         <p:sp>
           <p:nvSpPr>
-            <p:cNvPr id="537" name="Shape"/>
+            <p:cNvPr id="536" name="Shape"/>
             <p:cNvSpPr/>
             <p:nvPr/>
           </p:nvSpPr>
@@ -28529,7 +28500,7 @@
       </p:grpSp>
       <p:grpSp>
         <p:nvGrpSpPr>
-          <p:cNvPr id="543" name="Cube 71"/>
+          <p:cNvPr id="542" name="Cube 71"/>
           <p:cNvGrpSpPr/>
           <p:nvPr/>
         </p:nvGrpSpPr>
@@ -28543,7 +28514,7 @@
         </p:grpSpPr>
         <p:sp>
           <p:nvSpPr>
-            <p:cNvPr id="539" name="Shape"/>
+            <p:cNvPr id="538" name="Shape"/>
             <p:cNvSpPr/>
             <p:nvPr/>
           </p:nvSpPr>
@@ -28632,7 +28603,7 @@
         </p:sp>
         <p:sp>
           <p:nvSpPr>
-            <p:cNvPr id="540" name="Shape"/>
+            <p:cNvPr id="539" name="Shape"/>
             <p:cNvSpPr/>
             <p:nvPr/>
           </p:nvSpPr>
@@ -28717,7 +28688,7 @@
         </p:sp>
         <p:sp>
           <p:nvSpPr>
-            <p:cNvPr id="541" name="Shape"/>
+            <p:cNvPr id="540" name="Shape"/>
             <p:cNvSpPr/>
             <p:nvPr/>
           </p:nvSpPr>
@@ -28802,7 +28773,7 @@
         </p:sp>
         <p:sp>
           <p:nvSpPr>
-            <p:cNvPr id="542" name="Shape"/>
+            <p:cNvPr id="541" name="Shape"/>
             <p:cNvSpPr/>
             <p:nvPr/>
           </p:nvSpPr>
@@ -28908,7 +28879,7 @@
       </p:grpSp>
       <p:grpSp>
         <p:nvGrpSpPr>
-          <p:cNvPr id="548" name="Cube 72"/>
+          <p:cNvPr id="547" name="Cube 72"/>
           <p:cNvGrpSpPr/>
           <p:nvPr/>
         </p:nvGrpSpPr>
@@ -28922,7 +28893,7 @@
         </p:grpSpPr>
         <p:sp>
           <p:nvSpPr>
-            <p:cNvPr id="544" name="Shape"/>
+            <p:cNvPr id="543" name="Shape"/>
             <p:cNvSpPr/>
             <p:nvPr/>
           </p:nvSpPr>
@@ -29011,7 +28982,7 @@
         </p:sp>
         <p:sp>
           <p:nvSpPr>
-            <p:cNvPr id="545" name="Shape"/>
+            <p:cNvPr id="544" name="Shape"/>
             <p:cNvSpPr/>
             <p:nvPr/>
           </p:nvSpPr>
@@ -29096,7 +29067,7 @@
         </p:sp>
         <p:sp>
           <p:nvSpPr>
-            <p:cNvPr id="546" name="Shape"/>
+            <p:cNvPr id="545" name="Shape"/>
             <p:cNvSpPr/>
             <p:nvPr/>
           </p:nvSpPr>
@@ -29181,7 +29152,7 @@
         </p:sp>
         <p:sp>
           <p:nvSpPr>
-            <p:cNvPr id="547" name="Shape"/>
+            <p:cNvPr id="546" name="Shape"/>
             <p:cNvSpPr/>
             <p:nvPr/>
           </p:nvSpPr>
@@ -29287,7 +29258,7 @@
       </p:grpSp>
       <p:grpSp>
         <p:nvGrpSpPr>
-          <p:cNvPr id="553" name="Cube 80"/>
+          <p:cNvPr id="552" name="Cube 80"/>
           <p:cNvGrpSpPr/>
           <p:nvPr/>
         </p:nvGrpSpPr>
@@ -29301,7 +29272,7 @@
         </p:grpSpPr>
         <p:sp>
           <p:nvSpPr>
-            <p:cNvPr id="549" name="Shape"/>
+            <p:cNvPr id="548" name="Shape"/>
             <p:cNvSpPr/>
             <p:nvPr/>
           </p:nvSpPr>
@@ -29390,7 +29361,7 @@
         </p:sp>
         <p:sp>
           <p:nvSpPr>
-            <p:cNvPr id="550" name="Shape"/>
+            <p:cNvPr id="549" name="Shape"/>
             <p:cNvSpPr/>
             <p:nvPr/>
           </p:nvSpPr>
@@ -29475,7 +29446,7 @@
         </p:sp>
         <p:sp>
           <p:nvSpPr>
-            <p:cNvPr id="551" name="Shape"/>
+            <p:cNvPr id="550" name="Shape"/>
             <p:cNvSpPr/>
             <p:nvPr/>
           </p:nvSpPr>
@@ -29560,7 +29531,7 @@
         </p:sp>
         <p:sp>
           <p:nvSpPr>
-            <p:cNvPr id="552" name="Shape"/>
+            <p:cNvPr id="551" name="Shape"/>
             <p:cNvSpPr/>
             <p:nvPr/>
           </p:nvSpPr>
@@ -29666,7 +29637,7 @@
       </p:grpSp>
       <p:grpSp>
         <p:nvGrpSpPr>
-          <p:cNvPr id="558" name="Cube 81"/>
+          <p:cNvPr id="557" name="Cube 81"/>
           <p:cNvGrpSpPr/>
           <p:nvPr/>
         </p:nvGrpSpPr>
@@ -29680,7 +29651,7 @@
         </p:grpSpPr>
         <p:sp>
           <p:nvSpPr>
-            <p:cNvPr id="554" name="Shape"/>
+            <p:cNvPr id="553" name="Shape"/>
             <p:cNvSpPr/>
             <p:nvPr/>
           </p:nvSpPr>
@@ -29769,7 +29740,7 @@
         </p:sp>
         <p:sp>
           <p:nvSpPr>
-            <p:cNvPr id="555" name="Shape"/>
+            <p:cNvPr id="554" name="Shape"/>
             <p:cNvSpPr/>
             <p:nvPr/>
           </p:nvSpPr>
@@ -29854,7 +29825,7 @@
         </p:sp>
         <p:sp>
           <p:nvSpPr>
-            <p:cNvPr id="556" name="Shape"/>
+            <p:cNvPr id="555" name="Shape"/>
             <p:cNvSpPr/>
             <p:nvPr/>
           </p:nvSpPr>
@@ -29939,7 +29910,7 @@
         </p:sp>
         <p:sp>
           <p:nvSpPr>
-            <p:cNvPr id="557" name="Shape"/>
+            <p:cNvPr id="556" name="Shape"/>
             <p:cNvSpPr/>
             <p:nvPr/>
           </p:nvSpPr>
@@ -30045,7 +30016,7 @@
       </p:grpSp>
       <p:grpSp>
         <p:nvGrpSpPr>
-          <p:cNvPr id="563" name="Cube 83"/>
+          <p:cNvPr id="562" name="Cube 83"/>
           <p:cNvGrpSpPr/>
           <p:nvPr/>
         </p:nvGrpSpPr>
@@ -30059,7 +30030,7 @@
         </p:grpSpPr>
         <p:sp>
           <p:nvSpPr>
-            <p:cNvPr id="559" name="Shape"/>
+            <p:cNvPr id="558" name="Shape"/>
             <p:cNvSpPr/>
             <p:nvPr/>
           </p:nvSpPr>
@@ -30148,7 +30119,7 @@
         </p:sp>
         <p:sp>
           <p:nvSpPr>
-            <p:cNvPr id="560" name="Shape"/>
+            <p:cNvPr id="559" name="Shape"/>
             <p:cNvSpPr/>
             <p:nvPr/>
           </p:nvSpPr>
@@ -30233,7 +30204,7 @@
         </p:sp>
         <p:sp>
           <p:nvSpPr>
-            <p:cNvPr id="561" name="Shape"/>
+            <p:cNvPr id="560" name="Shape"/>
             <p:cNvSpPr/>
             <p:nvPr/>
           </p:nvSpPr>
@@ -30318,7 +30289,7 @@
         </p:sp>
         <p:sp>
           <p:nvSpPr>
-            <p:cNvPr id="562" name="Shape"/>
+            <p:cNvPr id="561" name="Shape"/>
             <p:cNvSpPr/>
             <p:nvPr/>
           </p:nvSpPr>
@@ -30424,7 +30395,7 @@
       </p:grpSp>
       <p:grpSp>
         <p:nvGrpSpPr>
-          <p:cNvPr id="568" name="Cube 84"/>
+          <p:cNvPr id="567" name="Cube 84"/>
           <p:cNvGrpSpPr/>
           <p:nvPr/>
         </p:nvGrpSpPr>
@@ -30438,7 +30409,7 @@
         </p:grpSpPr>
         <p:sp>
           <p:nvSpPr>
-            <p:cNvPr id="564" name="Shape"/>
+            <p:cNvPr id="563" name="Shape"/>
             <p:cNvSpPr/>
             <p:nvPr/>
           </p:nvSpPr>
@@ -30527,7 +30498,7 @@
         </p:sp>
         <p:sp>
           <p:nvSpPr>
-            <p:cNvPr id="565" name="Shape"/>
+            <p:cNvPr id="564" name="Shape"/>
             <p:cNvSpPr/>
             <p:nvPr/>
           </p:nvSpPr>
@@ -30612,7 +30583,7 @@
         </p:sp>
         <p:sp>
           <p:nvSpPr>
-            <p:cNvPr id="566" name="Shape"/>
+            <p:cNvPr id="565" name="Shape"/>
             <p:cNvSpPr/>
             <p:nvPr/>
           </p:nvSpPr>
@@ -30697,7 +30668,7 @@
         </p:sp>
         <p:sp>
           <p:nvSpPr>
-            <p:cNvPr id="567" name="Shape"/>
+            <p:cNvPr id="566" name="Shape"/>
             <p:cNvSpPr/>
             <p:nvPr/>
           </p:nvSpPr>
@@ -30803,7 +30774,7 @@
       </p:grpSp>
       <p:grpSp>
         <p:nvGrpSpPr>
-          <p:cNvPr id="573" name="Cube 85"/>
+          <p:cNvPr id="572" name="Cube 85"/>
           <p:cNvGrpSpPr/>
           <p:nvPr/>
         </p:nvGrpSpPr>
@@ -30817,7 +30788,7 @@
         </p:grpSpPr>
         <p:sp>
           <p:nvSpPr>
-            <p:cNvPr id="569" name="Shape"/>
+            <p:cNvPr id="568" name="Shape"/>
             <p:cNvSpPr/>
             <p:nvPr/>
           </p:nvSpPr>
@@ -30906,7 +30877,7 @@
         </p:sp>
         <p:sp>
           <p:nvSpPr>
-            <p:cNvPr id="570" name="Shape"/>
+            <p:cNvPr id="569" name="Shape"/>
             <p:cNvSpPr/>
             <p:nvPr/>
           </p:nvSpPr>
@@ -30991,7 +30962,7 @@
         </p:sp>
         <p:sp>
           <p:nvSpPr>
-            <p:cNvPr id="571" name="Shape"/>
+            <p:cNvPr id="570" name="Shape"/>
             <p:cNvSpPr/>
             <p:nvPr/>
           </p:nvSpPr>
@@ -31076,7 +31047,7 @@
         </p:sp>
         <p:sp>
           <p:nvSpPr>
-            <p:cNvPr id="572" name="Shape"/>
+            <p:cNvPr id="571" name="Shape"/>
             <p:cNvSpPr/>
             <p:nvPr/>
           </p:nvSpPr>
@@ -31182,7 +31153,7 @@
       </p:grpSp>
       <p:grpSp>
         <p:nvGrpSpPr>
-          <p:cNvPr id="578" name="Cube 88"/>
+          <p:cNvPr id="577" name="Cube 88"/>
           <p:cNvGrpSpPr/>
           <p:nvPr/>
         </p:nvGrpSpPr>
@@ -31196,7 +31167,7 @@
         </p:grpSpPr>
         <p:sp>
           <p:nvSpPr>
-            <p:cNvPr id="574" name="Shape"/>
+            <p:cNvPr id="573" name="Shape"/>
             <p:cNvSpPr/>
             <p:nvPr/>
           </p:nvSpPr>
@@ -31285,7 +31256,7 @@
         </p:sp>
         <p:sp>
           <p:nvSpPr>
-            <p:cNvPr id="575" name="Shape"/>
+            <p:cNvPr id="574" name="Shape"/>
             <p:cNvSpPr/>
             <p:nvPr/>
           </p:nvSpPr>
@@ -31370,7 +31341,7 @@
         </p:sp>
         <p:sp>
           <p:nvSpPr>
-            <p:cNvPr id="576" name="Shape"/>
+            <p:cNvPr id="575" name="Shape"/>
             <p:cNvSpPr/>
             <p:nvPr/>
           </p:nvSpPr>
@@ -31455,7 +31426,7 @@
         </p:sp>
         <p:sp>
           <p:nvSpPr>
-            <p:cNvPr id="577" name="Shape"/>
+            <p:cNvPr id="576" name="Shape"/>
             <p:cNvSpPr/>
             <p:nvPr/>
           </p:nvSpPr>
@@ -31561,7 +31532,7 @@
       </p:grpSp>
       <p:grpSp>
         <p:nvGrpSpPr>
-          <p:cNvPr id="583" name="Cube 89"/>
+          <p:cNvPr id="582" name="Cube 89"/>
           <p:cNvGrpSpPr/>
           <p:nvPr/>
         </p:nvGrpSpPr>
@@ -31575,7 +31546,7 @@
         </p:grpSpPr>
         <p:sp>
           <p:nvSpPr>
-            <p:cNvPr id="579" name="Shape"/>
+            <p:cNvPr id="578" name="Shape"/>
             <p:cNvSpPr/>
             <p:nvPr/>
           </p:nvSpPr>
@@ -31664,7 +31635,7 @@
         </p:sp>
         <p:sp>
           <p:nvSpPr>
-            <p:cNvPr id="580" name="Shape"/>
+            <p:cNvPr id="579" name="Shape"/>
             <p:cNvSpPr/>
             <p:nvPr/>
           </p:nvSpPr>
@@ -31749,7 +31720,7 @@
         </p:sp>
         <p:sp>
           <p:nvSpPr>
-            <p:cNvPr id="581" name="Shape"/>
+            <p:cNvPr id="580" name="Shape"/>
             <p:cNvSpPr/>
             <p:nvPr/>
           </p:nvSpPr>
@@ -31834,7 +31805,7 @@
         </p:sp>
         <p:sp>
           <p:nvSpPr>
-            <p:cNvPr id="582" name="Shape"/>
+            <p:cNvPr id="581" name="Shape"/>
             <p:cNvSpPr/>
             <p:nvPr/>
           </p:nvSpPr>
@@ -31940,7 +31911,7 @@
       </p:grpSp>
       <p:grpSp>
         <p:nvGrpSpPr>
-          <p:cNvPr id="588" name="Cube 90"/>
+          <p:cNvPr id="587" name="Cube 90"/>
           <p:cNvGrpSpPr/>
           <p:nvPr/>
         </p:nvGrpSpPr>
@@ -31954,7 +31925,7 @@
         </p:grpSpPr>
         <p:sp>
           <p:nvSpPr>
-            <p:cNvPr id="584" name="Shape"/>
+            <p:cNvPr id="583" name="Shape"/>
             <p:cNvSpPr/>
             <p:nvPr/>
           </p:nvSpPr>
@@ -32043,7 +32014,7 @@
         </p:sp>
         <p:sp>
           <p:nvSpPr>
-            <p:cNvPr id="585" name="Shape"/>
+            <p:cNvPr id="584" name="Shape"/>
             <p:cNvSpPr/>
             <p:nvPr/>
           </p:nvSpPr>
@@ -32128,7 +32099,7 @@
         </p:sp>
         <p:sp>
           <p:nvSpPr>
-            <p:cNvPr id="586" name="Shape"/>
+            <p:cNvPr id="585" name="Shape"/>
             <p:cNvSpPr/>
             <p:nvPr/>
           </p:nvSpPr>
@@ -32213,7 +32184,7 @@
         </p:sp>
         <p:sp>
           <p:nvSpPr>
-            <p:cNvPr id="587" name="Shape"/>
+            <p:cNvPr id="586" name="Shape"/>
             <p:cNvSpPr/>
             <p:nvPr/>
           </p:nvSpPr>
@@ -32319,7 +32290,7 @@
       </p:grpSp>
       <p:grpSp>
         <p:nvGrpSpPr>
-          <p:cNvPr id="593" name="Cube 91"/>
+          <p:cNvPr id="592" name="Cube 91"/>
           <p:cNvGrpSpPr/>
           <p:nvPr/>
         </p:nvGrpSpPr>
@@ -32333,7 +32304,7 @@
         </p:grpSpPr>
         <p:sp>
           <p:nvSpPr>
-            <p:cNvPr id="589" name="Shape"/>
+            <p:cNvPr id="588" name="Shape"/>
             <p:cNvSpPr/>
             <p:nvPr/>
           </p:nvSpPr>
@@ -32422,7 +32393,7 @@
         </p:sp>
         <p:sp>
           <p:nvSpPr>
-            <p:cNvPr id="590" name="Shape"/>
+            <p:cNvPr id="589" name="Shape"/>
             <p:cNvSpPr/>
             <p:nvPr/>
           </p:nvSpPr>
@@ -32507,7 +32478,7 @@
         </p:sp>
         <p:sp>
           <p:nvSpPr>
-            <p:cNvPr id="591" name="Shape"/>
+            <p:cNvPr id="590" name="Shape"/>
             <p:cNvSpPr/>
             <p:nvPr/>
           </p:nvSpPr>
@@ -32592,7 +32563,7 @@
         </p:sp>
         <p:sp>
           <p:nvSpPr>
-            <p:cNvPr id="592" name="Shape"/>
+            <p:cNvPr id="591" name="Shape"/>
             <p:cNvSpPr/>
             <p:nvPr/>
           </p:nvSpPr>
@@ -32698,7 +32669,7 @@
       </p:grpSp>
       <p:sp>
         <p:nvSpPr>
-          <p:cNvPr id="594" name="Rectangle 93"/>
+          <p:cNvPr id="593" name="Rectangle 93"/>
           <p:cNvSpPr/>
           <p:nvPr/>
         </p:nvSpPr>
@@ -32753,7 +32724,7 @@
       </p:sp>
       <p:sp>
         <p:nvSpPr>
-          <p:cNvPr id="595" name="Rectangle 94"/>
+          <p:cNvPr id="594" name="Rectangle 94"/>
           <p:cNvSpPr/>
           <p:nvPr/>
         </p:nvSpPr>
@@ -32808,7 +32779,7 @@
       </p:sp>
       <p:sp>
         <p:nvSpPr>
-          <p:cNvPr id="596" name="Rectangle 95"/>
+          <p:cNvPr id="595" name="Rectangle 95"/>
           <p:cNvSpPr/>
           <p:nvPr/>
         </p:nvSpPr>
@@ -32863,7 +32834,7 @@
       </p:sp>
       <p:sp>
         <p:nvSpPr>
-          <p:cNvPr id="597" name="Rectangle 96"/>
+          <p:cNvPr id="596" name="Rectangle 96"/>
           <p:cNvSpPr/>
           <p:nvPr/>
         </p:nvSpPr>
@@ -32918,7 +32889,7 @@
       </p:sp>
       <p:sp>
         <p:nvSpPr>
-          <p:cNvPr id="598" name="Rectangle 97"/>
+          <p:cNvPr id="597" name="Rectangle 97"/>
           <p:cNvSpPr/>
           <p:nvPr/>
         </p:nvSpPr>
@@ -32973,7 +32944,7 @@
       </p:sp>
       <p:sp>
         <p:nvSpPr>
-          <p:cNvPr id="599" name="Rectangle 98"/>
+          <p:cNvPr id="598" name="Rectangle 98"/>
           <p:cNvSpPr/>
           <p:nvPr/>
         </p:nvSpPr>
@@ -33028,7 +32999,7 @@
       </p:sp>
       <p:sp>
         <p:nvSpPr>
-          <p:cNvPr id="600" name="Rectangle 99"/>
+          <p:cNvPr id="599" name="Rectangle 99"/>
           <p:cNvSpPr/>
           <p:nvPr/>
         </p:nvSpPr>
@@ -33083,7 +33054,7 @@
       </p:sp>
       <p:sp>
         <p:nvSpPr>
-          <p:cNvPr id="601" name="Rectangle 100"/>
+          <p:cNvPr id="600" name="Rectangle 100"/>
           <p:cNvSpPr/>
           <p:nvPr/>
         </p:nvSpPr>
@@ -33138,7 +33109,7 @@
       </p:sp>
       <p:sp>
         <p:nvSpPr>
-          <p:cNvPr id="602" name="Rectangle 101"/>
+          <p:cNvPr id="601" name="Rectangle 101"/>
           <p:cNvSpPr/>
           <p:nvPr/>
         </p:nvSpPr>
@@ -33193,7 +33164,7 @@
       </p:sp>
       <p:sp>
         <p:nvSpPr>
-          <p:cNvPr id="603" name="Rectangle 102"/>
+          <p:cNvPr id="602" name="Rectangle 102"/>
           <p:cNvSpPr/>
           <p:nvPr/>
         </p:nvSpPr>
@@ -33248,7 +33219,7 @@
       </p:sp>
       <p:sp>
         <p:nvSpPr>
-          <p:cNvPr id="604" name="Rectangle 103"/>
+          <p:cNvPr id="603" name="Rectangle 103"/>
           <p:cNvSpPr/>
           <p:nvPr/>
         </p:nvSpPr>
@@ -33303,7 +33274,7 @@
       </p:sp>
       <p:sp>
         <p:nvSpPr>
-          <p:cNvPr id="605" name="Rectangle 104"/>
+          <p:cNvPr id="604" name="Rectangle 104"/>
           <p:cNvSpPr/>
           <p:nvPr/>
         </p:nvSpPr>
@@ -33358,7 +33329,7 @@
       </p:sp>
       <p:sp>
         <p:nvSpPr>
-          <p:cNvPr id="606" name="Rectangle 105"/>
+          <p:cNvPr id="605" name="Rectangle 105"/>
           <p:cNvSpPr/>
           <p:nvPr/>
         </p:nvSpPr>
@@ -33413,7 +33384,7 @@
       </p:sp>
       <p:sp>
         <p:nvSpPr>
-          <p:cNvPr id="607" name="Isosceles Triangle 106"/>
+          <p:cNvPr id="606" name="Isosceles Triangle 106"/>
           <p:cNvSpPr/>
           <p:nvPr/>
         </p:nvSpPr>
@@ -33465,7 +33436,7 @@
       </p:sp>
       <p:sp>
         <p:nvSpPr>
-          <p:cNvPr id="608" name="Rectangle 123"/>
+          <p:cNvPr id="607" name="Rectangle 123"/>
           <p:cNvSpPr/>
           <p:nvPr/>
         </p:nvSpPr>
@@ -33520,7 +33491,7 @@
       </p:sp>
       <p:sp>
         <p:nvSpPr>
-          <p:cNvPr id="609" name="Rectangle 124"/>
+          <p:cNvPr id="608" name="Rectangle 124"/>
           <p:cNvSpPr/>
           <p:nvPr/>
         </p:nvSpPr>
@@ -33575,7 +33546,7 @@
       </p:sp>
       <p:sp>
         <p:nvSpPr>
-          <p:cNvPr id="610" name="Rectangle 125"/>
+          <p:cNvPr id="609" name="Rectangle 125"/>
           <p:cNvSpPr/>
           <p:nvPr/>
         </p:nvSpPr>
@@ -33630,7 +33601,7 @@
       </p:sp>
       <p:sp>
         <p:nvSpPr>
-          <p:cNvPr id="611" name="Rectangle 126"/>
+          <p:cNvPr id="610" name="Rectangle 126"/>
           <p:cNvSpPr/>
           <p:nvPr/>
         </p:nvSpPr>
@@ -33685,7 +33656,7 @@
       </p:sp>
       <p:sp>
         <p:nvSpPr>
-          <p:cNvPr id="612" name="Rectangle 128"/>
+          <p:cNvPr id="611" name="Rectangle 128"/>
           <p:cNvSpPr/>
           <p:nvPr/>
         </p:nvSpPr>
@@ -33740,7 +33711,7 @@
       </p:sp>
       <p:sp>
         <p:nvSpPr>
-          <p:cNvPr id="613" name="Rectangle 129"/>
+          <p:cNvPr id="612" name="Rectangle 129"/>
           <p:cNvSpPr/>
           <p:nvPr/>
         </p:nvSpPr>
@@ -33795,7 +33766,7 @@
       </p:sp>
       <p:sp>
         <p:nvSpPr>
-          <p:cNvPr id="614" name="Rectangle 132"/>
+          <p:cNvPr id="613" name="Rectangle 132"/>
           <p:cNvSpPr/>
           <p:nvPr/>
         </p:nvSpPr>
@@ -33850,7 +33821,7 @@
       </p:sp>
       <p:sp>
         <p:nvSpPr>
-          <p:cNvPr id="615" name="Rectangle 133"/>
+          <p:cNvPr id="614" name="Rectangle 133"/>
           <p:cNvSpPr/>
           <p:nvPr/>
         </p:nvSpPr>
@@ -33905,7 +33876,7 @@
       </p:sp>
       <p:sp>
         <p:nvSpPr>
-          <p:cNvPr id="616" name="Rectangle 135"/>
+          <p:cNvPr id="615" name="Rectangle 135"/>
           <p:cNvSpPr/>
           <p:nvPr/>
         </p:nvSpPr>
@@ -33960,7 +33931,7 @@
       </p:sp>
       <p:sp>
         <p:nvSpPr>
-          <p:cNvPr id="617" name="Rectangle 136"/>
+          <p:cNvPr id="616" name="Rectangle 136"/>
           <p:cNvSpPr/>
           <p:nvPr/>
         </p:nvSpPr>
@@ -34015,7 +33986,7 @@
       </p:sp>
       <p:sp>
         <p:nvSpPr>
-          <p:cNvPr id="618" name="Rectangle 137"/>
+          <p:cNvPr id="617" name="Rectangle 137"/>
           <p:cNvSpPr/>
           <p:nvPr/>
         </p:nvSpPr>
@@ -34070,7 +34041,7 @@
       </p:sp>
       <p:sp>
         <p:nvSpPr>
-          <p:cNvPr id="619" name="Rectangle 138"/>
+          <p:cNvPr id="618" name="Rectangle 138"/>
           <p:cNvSpPr/>
           <p:nvPr/>
         </p:nvSpPr>
@@ -34125,7 +34096,7 @@
       </p:sp>
       <p:sp>
         <p:nvSpPr>
-          <p:cNvPr id="620" name="Rectangle 139"/>
+          <p:cNvPr id="619" name="Rectangle 139"/>
           <p:cNvSpPr/>
           <p:nvPr/>
         </p:nvSpPr>
@@ -34180,7 +34151,7 @@
       </p:sp>
       <p:sp>
         <p:nvSpPr>
-          <p:cNvPr id="621" name="Isosceles Triangle 140"/>
+          <p:cNvPr id="620" name="Isosceles Triangle 140"/>
           <p:cNvSpPr/>
           <p:nvPr/>
         </p:nvSpPr>
@@ -34232,7 +34203,7 @@
       </p:sp>
       <p:sp>
         <p:nvSpPr>
-          <p:cNvPr id="622" name="Rectangle 141"/>
+          <p:cNvPr id="621" name="Rectangle 141"/>
           <p:cNvSpPr/>
           <p:nvPr/>
         </p:nvSpPr>
@@ -34287,7 +34258,7 @@
       </p:sp>
       <p:sp>
         <p:nvSpPr>
-          <p:cNvPr id="623" name="Rectangle 142"/>
+          <p:cNvPr id="622" name="Rectangle 142"/>
           <p:cNvSpPr/>
           <p:nvPr/>
         </p:nvSpPr>
@@ -34342,7 +34313,7 @@
       </p:sp>
       <p:sp>
         <p:nvSpPr>
-          <p:cNvPr id="624" name="Rectangle 143"/>
+          <p:cNvPr id="623" name="Rectangle 143"/>
           <p:cNvSpPr/>
           <p:nvPr/>
         </p:nvSpPr>
@@ -34397,7 +34368,7 @@
       </p:sp>
       <p:sp>
         <p:nvSpPr>
-          <p:cNvPr id="625" name="Rectangle 144"/>
+          <p:cNvPr id="624" name="Rectangle 144"/>
           <p:cNvSpPr/>
           <p:nvPr/>
         </p:nvSpPr>
@@ -34452,7 +34423,7 @@
       </p:sp>
       <p:sp>
         <p:nvSpPr>
-          <p:cNvPr id="626" name="Rectangle 145"/>
+          <p:cNvPr id="625" name="Rectangle 145"/>
           <p:cNvSpPr/>
           <p:nvPr/>
         </p:nvSpPr>
@@ -34507,7 +34478,7 @@
       </p:sp>
       <p:sp>
         <p:nvSpPr>
-          <p:cNvPr id="627" name="Rectangle 146"/>
+          <p:cNvPr id="626" name="Rectangle 146"/>
           <p:cNvSpPr/>
           <p:nvPr/>
         </p:nvSpPr>
@@ -34562,7 +34533,7 @@
       </p:sp>
       <p:sp>
         <p:nvSpPr>
-          <p:cNvPr id="628" name="Rectangle 147"/>
+          <p:cNvPr id="627" name="Rectangle 147"/>
           <p:cNvSpPr/>
           <p:nvPr/>
         </p:nvSpPr>
@@ -34617,7 +34588,7 @@
       </p:sp>
       <p:sp>
         <p:nvSpPr>
-          <p:cNvPr id="629" name="Rectangle 148"/>
+          <p:cNvPr id="628" name="Rectangle 148"/>
           <p:cNvSpPr/>
           <p:nvPr/>
         </p:nvSpPr>
@@ -34672,7 +34643,7 @@
       </p:sp>
       <p:sp>
         <p:nvSpPr>
-          <p:cNvPr id="630" name="Rectangle 149"/>
+          <p:cNvPr id="629" name="Rectangle 149"/>
           <p:cNvSpPr/>
           <p:nvPr/>
         </p:nvSpPr>
@@ -34727,7 +34698,7 @@
       </p:sp>
       <p:sp>
         <p:nvSpPr>
-          <p:cNvPr id="631" name="Rectangle 150"/>
+          <p:cNvPr id="630" name="Rectangle 150"/>
           <p:cNvSpPr/>
           <p:nvPr/>
         </p:nvSpPr>
@@ -34782,7 +34753,7 @@
       </p:sp>
       <p:sp>
         <p:nvSpPr>
-          <p:cNvPr id="632" name="Rectangle 151"/>
+          <p:cNvPr id="631" name="Rectangle 151"/>
           <p:cNvSpPr/>
           <p:nvPr/>
         </p:nvSpPr>
@@ -34837,7 +34808,7 @@
       </p:sp>
       <p:sp>
         <p:nvSpPr>
-          <p:cNvPr id="633" name="Rectangle 152"/>
+          <p:cNvPr id="632" name="Rectangle 152"/>
           <p:cNvSpPr/>
           <p:nvPr/>
         </p:nvSpPr>
@@ -34892,7 +34863,7 @@
       </p:sp>
       <p:sp>
         <p:nvSpPr>
-          <p:cNvPr id="634" name="Rectangle 153"/>
+          <p:cNvPr id="633" name="Rectangle 153"/>
           <p:cNvSpPr/>
           <p:nvPr/>
         </p:nvSpPr>
@@ -34947,7 +34918,7 @@
       </p:sp>
       <p:sp>
         <p:nvSpPr>
-          <p:cNvPr id="635" name="Isosceles Triangle 154"/>
+          <p:cNvPr id="634" name="Isosceles Triangle 154"/>
           <p:cNvSpPr/>
           <p:nvPr/>
         </p:nvSpPr>
@@ -34999,7 +34970,7 @@
       </p:sp>
       <p:sp>
         <p:nvSpPr>
-          <p:cNvPr id="636" name="every(.x, .p, …) Do all element pass a test?…"/>
+          <p:cNvPr id="635" name="every(.x, .p, …) Do all element pass a test?…"/>
           <p:cNvSpPr txBox="1"/>
           <p:nvPr/>
         </p:nvSpPr>
@@ -35327,7 +35298,7 @@
       </p:sp>
       <p:sp>
         <p:nvSpPr>
-          <p:cNvPr id="637" name="Rectangle 158"/>
+          <p:cNvPr id="636" name="Rectangle 158"/>
           <p:cNvSpPr/>
           <p:nvPr/>
         </p:nvSpPr>
@@ -35382,7 +35353,7 @@
       </p:sp>
       <p:sp>
         <p:nvSpPr>
-          <p:cNvPr id="638" name="Rectangle 160"/>
+          <p:cNvPr id="637" name="Rectangle 160"/>
           <p:cNvSpPr/>
           <p:nvPr/>
         </p:nvSpPr>
@@ -35437,7 +35408,7 @@
       </p:sp>
       <p:sp>
         <p:nvSpPr>
-          <p:cNvPr id="639" name="Rectangle 161"/>
+          <p:cNvPr id="638" name="Rectangle 161"/>
           <p:cNvSpPr/>
           <p:nvPr/>
         </p:nvSpPr>
@@ -35492,7 +35463,7 @@
       </p:sp>
       <p:sp>
         <p:nvSpPr>
-          <p:cNvPr id="640" name="Rectangle 162"/>
+          <p:cNvPr id="639" name="Rectangle 162"/>
           <p:cNvSpPr/>
           <p:nvPr/>
         </p:nvSpPr>
@@ -35547,7 +35518,7 @@
       </p:sp>
       <p:sp>
         <p:nvSpPr>
-          <p:cNvPr id="641" name="Rectangle 163"/>
+          <p:cNvPr id="640" name="Rectangle 163"/>
           <p:cNvSpPr/>
           <p:nvPr/>
         </p:nvSpPr>
@@ -35602,7 +35573,7 @@
       </p:sp>
       <p:sp>
         <p:nvSpPr>
-          <p:cNvPr id="642" name="Isosceles Triangle 164"/>
+          <p:cNvPr id="641" name="Isosceles Triangle 164"/>
           <p:cNvSpPr/>
           <p:nvPr/>
         </p:nvSpPr>
@@ -35654,7 +35625,7 @@
       </p:sp>
       <p:sp>
         <p:nvSpPr>
-          <p:cNvPr id="643" name="Rectangle 165"/>
+          <p:cNvPr id="642" name="Rectangle 165"/>
           <p:cNvSpPr/>
           <p:nvPr/>
         </p:nvSpPr>
@@ -35709,7 +35680,7 @@
       </p:sp>
       <p:sp>
         <p:nvSpPr>
-          <p:cNvPr id="644" name="Rectangle 166"/>
+          <p:cNvPr id="643" name="Rectangle 166"/>
           <p:cNvSpPr/>
           <p:nvPr/>
         </p:nvSpPr>
@@ -35764,7 +35735,7 @@
       </p:sp>
       <p:sp>
         <p:nvSpPr>
-          <p:cNvPr id="645" name="Rectangle 167"/>
+          <p:cNvPr id="644" name="Rectangle 167"/>
           <p:cNvSpPr/>
           <p:nvPr/>
         </p:nvSpPr>
@@ -35819,7 +35790,7 @@
       </p:sp>
       <p:sp>
         <p:nvSpPr>
-          <p:cNvPr id="646" name="Rectangle 168"/>
+          <p:cNvPr id="645" name="Rectangle 168"/>
           <p:cNvSpPr/>
           <p:nvPr/>
         </p:nvSpPr>
@@ -35874,7 +35845,7 @@
       </p:sp>
       <p:sp>
         <p:nvSpPr>
-          <p:cNvPr id="647" name="Rectangle 169"/>
+          <p:cNvPr id="646" name="Rectangle 169"/>
           <p:cNvSpPr/>
           <p:nvPr/>
         </p:nvSpPr>
@@ -35929,7 +35900,7 @@
       </p:sp>
       <p:sp>
         <p:nvSpPr>
-          <p:cNvPr id="648" name="Isosceles Triangle 170"/>
+          <p:cNvPr id="647" name="Isosceles Triangle 170"/>
           <p:cNvSpPr/>
           <p:nvPr/>
         </p:nvSpPr>
@@ -35981,7 +35952,7 @@
       </p:sp>
       <p:sp>
         <p:nvSpPr>
-          <p:cNvPr id="649" name="Rectangle 171"/>
+          <p:cNvPr id="648" name="Rectangle 171"/>
           <p:cNvSpPr/>
           <p:nvPr/>
         </p:nvSpPr>
@@ -36036,7 +36007,7 @@
       </p:sp>
       <p:sp>
         <p:nvSpPr>
-          <p:cNvPr id="650" name="Rectangle 172"/>
+          <p:cNvPr id="649" name="Rectangle 172"/>
           <p:cNvSpPr/>
           <p:nvPr/>
         </p:nvSpPr>
@@ -36091,7 +36062,7 @@
       </p:sp>
       <p:sp>
         <p:nvSpPr>
-          <p:cNvPr id="651" name="Rectangle 173"/>
+          <p:cNvPr id="650" name="Rectangle 173"/>
           <p:cNvSpPr/>
           <p:nvPr/>
         </p:nvSpPr>
@@ -36146,7 +36117,7 @@
       </p:sp>
       <p:sp>
         <p:nvSpPr>
-          <p:cNvPr id="652" name="Rectangle 174"/>
+          <p:cNvPr id="651" name="Rectangle 174"/>
           <p:cNvSpPr/>
           <p:nvPr/>
         </p:nvSpPr>
@@ -36201,7 +36172,7 @@
       </p:sp>
       <p:sp>
         <p:nvSpPr>
-          <p:cNvPr id="653" name="Rectangle 175"/>
+          <p:cNvPr id="652" name="Rectangle 175"/>
           <p:cNvSpPr/>
           <p:nvPr/>
         </p:nvSpPr>
@@ -36256,7 +36227,7 @@
       </p:sp>
       <p:sp>
         <p:nvSpPr>
-          <p:cNvPr id="654" name="Isosceles Triangle 176"/>
+          <p:cNvPr id="653" name="Isosceles Triangle 176"/>
           <p:cNvSpPr/>
           <p:nvPr/>
         </p:nvSpPr>
@@ -36308,7 +36279,7 @@
       </p:sp>
       <p:sp>
         <p:nvSpPr>
-          <p:cNvPr id="655" name="Rectangle 177"/>
+          <p:cNvPr id="654" name="Rectangle 177"/>
           <p:cNvSpPr/>
           <p:nvPr/>
         </p:nvSpPr>
@@ -36363,7 +36334,7 @@
       </p:sp>
       <p:sp>
         <p:nvSpPr>
-          <p:cNvPr id="656" name="Rectangle 178"/>
+          <p:cNvPr id="655" name="Rectangle 178"/>
           <p:cNvSpPr/>
           <p:nvPr/>
         </p:nvSpPr>
@@ -36418,7 +36389,7 @@
       </p:sp>
       <p:sp>
         <p:nvSpPr>
-          <p:cNvPr id="657" name="Rectangle 179"/>
+          <p:cNvPr id="656" name="Rectangle 179"/>
           <p:cNvSpPr/>
           <p:nvPr/>
         </p:nvSpPr>
@@ -36473,7 +36444,7 @@
       </p:sp>
       <p:sp>
         <p:nvSpPr>
-          <p:cNvPr id="658" name="Rectangle 180"/>
+          <p:cNvPr id="657" name="Rectangle 180"/>
           <p:cNvSpPr/>
           <p:nvPr/>
         </p:nvSpPr>
@@ -36528,7 +36499,7 @@
       </p:sp>
       <p:sp>
         <p:nvSpPr>
-          <p:cNvPr id="659" name="Rectangle 181"/>
+          <p:cNvPr id="658" name="Rectangle 181"/>
           <p:cNvSpPr/>
           <p:nvPr/>
         </p:nvSpPr>
@@ -36583,7 +36554,7 @@
       </p:sp>
       <p:sp>
         <p:nvSpPr>
-          <p:cNvPr id="660" name="Rectangle 182"/>
+          <p:cNvPr id="659" name="Rectangle 182"/>
           <p:cNvSpPr/>
           <p:nvPr/>
         </p:nvSpPr>
@@ -36638,7 +36609,7 @@
       </p:sp>
       <p:sp>
         <p:nvSpPr>
-          <p:cNvPr id="661" name="Rectangle 183"/>
+          <p:cNvPr id="660" name="Rectangle 183"/>
           <p:cNvSpPr/>
           <p:nvPr/>
         </p:nvSpPr>
@@ -36693,7 +36664,7 @@
       </p:sp>
       <p:sp>
         <p:nvSpPr>
-          <p:cNvPr id="662" name="Rectangle 184"/>
+          <p:cNvPr id="661" name="Rectangle 184"/>
           <p:cNvSpPr/>
           <p:nvPr/>
         </p:nvSpPr>
@@ -36748,7 +36719,7 @@
       </p:sp>
       <p:sp>
         <p:nvSpPr>
-          <p:cNvPr id="663" name="Rectangle 185"/>
+          <p:cNvPr id="662" name="Rectangle 185"/>
           <p:cNvSpPr/>
           <p:nvPr/>
         </p:nvSpPr>
@@ -36803,7 +36774,7 @@
       </p:sp>
       <p:sp>
         <p:nvSpPr>
-          <p:cNvPr id="664" name="Isosceles Triangle 186"/>
+          <p:cNvPr id="663" name="Isosceles Triangle 186"/>
           <p:cNvSpPr/>
           <p:nvPr/>
         </p:nvSpPr>
@@ -36855,7 +36826,7 @@
       </p:sp>
       <p:sp>
         <p:nvSpPr>
-          <p:cNvPr id="665" name="Rectangle 188"/>
+          <p:cNvPr id="664" name="Rectangle 188"/>
           <p:cNvSpPr/>
           <p:nvPr/>
         </p:nvSpPr>
@@ -36910,7 +36881,7 @@
       </p:sp>
       <p:sp>
         <p:nvSpPr>
-          <p:cNvPr id="666" name="Rectangle 189"/>
+          <p:cNvPr id="665" name="Rectangle 189"/>
           <p:cNvSpPr/>
           <p:nvPr/>
         </p:nvSpPr>
@@ -36965,7 +36936,7 @@
       </p:sp>
       <p:sp>
         <p:nvSpPr>
-          <p:cNvPr id="667" name="Rectangle 190"/>
+          <p:cNvPr id="666" name="Rectangle 190"/>
           <p:cNvSpPr/>
           <p:nvPr/>
         </p:nvSpPr>
@@ -37020,7 +36991,7 @@
       </p:sp>
       <p:sp>
         <p:nvSpPr>
-          <p:cNvPr id="668" name="Rectangle 191"/>
+          <p:cNvPr id="667" name="Rectangle 191"/>
           <p:cNvSpPr/>
           <p:nvPr/>
         </p:nvSpPr>
@@ -37075,7 +37046,7 @@
       </p:sp>
       <p:sp>
         <p:nvSpPr>
-          <p:cNvPr id="669" name="Basics"/>
+          <p:cNvPr id="668" name="Basics"/>
           <p:cNvSpPr txBox="1"/>
           <p:nvPr/>
         </p:nvSpPr>
@@ -37127,7 +37098,7 @@
       </p:sp>
       <p:sp>
         <p:nvSpPr>
-          <p:cNvPr id="670" name="Line"/>
+          <p:cNvPr id="669" name="Line"/>
           <p:cNvSpPr/>
           <p:nvPr/>
         </p:nvSpPr>
@@ -37156,7 +37127,7 @@
       </p:sp>
       <p:sp>
         <p:nvSpPr>
-          <p:cNvPr id="671" name="Rectangle"/>
+          <p:cNvPr id="670" name="Rectangle"/>
           <p:cNvSpPr/>
           <p:nvPr/>
         </p:nvSpPr>
@@ -37211,7 +37182,7 @@
       </p:sp>
       <p:sp>
         <p:nvSpPr>
-          <p:cNvPr id="672" name="Rectangle"/>
+          <p:cNvPr id="671" name="Rectangle"/>
           <p:cNvSpPr/>
           <p:nvPr/>
         </p:nvSpPr>
@@ -37266,7 +37237,7 @@
       </p:sp>
       <p:sp>
         <p:nvSpPr>
-          <p:cNvPr id="673" name="SUBTITLE"/>
+          <p:cNvPr id="672" name="SUBTITLE"/>
           <p:cNvSpPr txBox="1"/>
           <p:nvPr/>
         </p:nvSpPr>
@@ -37309,7 +37280,7 @@
       </p:sp>
       <p:sp>
         <p:nvSpPr>
-          <p:cNvPr id="674" name="every(.x, .p, …) Do all element pass a test?…"/>
+          <p:cNvPr id="673" name="every(.x, .p, …) Do all element pass a test?…"/>
           <p:cNvSpPr txBox="1"/>
           <p:nvPr/>
         </p:nvSpPr>
@@ -37488,7 +37459,7 @@
       </p:sp>
       <p:sp>
         <p:nvSpPr>
-          <p:cNvPr id="675" name="SUBTITLE"/>
+          <p:cNvPr id="674" name="SUBTITLE"/>
           <p:cNvSpPr txBox="1"/>
           <p:nvPr/>
         </p:nvSpPr>
@@ -37531,7 +37502,7 @@
       </p:sp>
       <p:sp>
         <p:nvSpPr>
-          <p:cNvPr id="676" name="every(.x, .p, …) Do all element pass a test?…"/>
+          <p:cNvPr id="675" name="every(.x, .p, …) Do all element pass a test?…"/>
           <p:cNvSpPr txBox="1"/>
           <p:nvPr/>
         </p:nvSpPr>
@@ -37810,7 +37781,7 @@
       </p:sp>
       <p:sp>
         <p:nvSpPr>
-          <p:cNvPr id="677" name="Rectangle"/>
+          <p:cNvPr id="676" name="Rectangle"/>
           <p:cNvSpPr/>
           <p:nvPr/>
         </p:nvSpPr>
@@ -37865,7 +37836,7 @@
       </p:sp>
       <p:sp>
         <p:nvSpPr>
-          <p:cNvPr id="678" name="SUBTITLE"/>
+          <p:cNvPr id="677" name="SUBTITLE"/>
           <p:cNvSpPr txBox="1"/>
           <p:nvPr/>
         </p:nvSpPr>
@@ -37908,7 +37879,7 @@
       </p:sp>
       <p:sp>
         <p:nvSpPr>
-          <p:cNvPr id="679" name="every(.x, .p, …) Do all element pass a test?…"/>
+          <p:cNvPr id="678" name="every(.x, .p, …) Do all element pass a test?…"/>
           <p:cNvSpPr txBox="1"/>
           <p:nvPr/>
         </p:nvSpPr>
@@ -38162,7 +38133,7 @@
       </p:sp>
       <p:sp>
         <p:nvSpPr>
-          <p:cNvPr id="680" name="Rectangle"/>
+          <p:cNvPr id="679" name="Rectangle"/>
           <p:cNvSpPr/>
           <p:nvPr/>
         </p:nvSpPr>
@@ -38219,7 +38190,7 @@
       </p:sp>
       <p:sp>
         <p:nvSpPr>
-          <p:cNvPr id="681" name="Rectangle"/>
+          <p:cNvPr id="680" name="Rectangle"/>
           <p:cNvSpPr/>
           <p:nvPr/>
         </p:nvSpPr>
@@ -38276,7 +38247,7 @@
       </p:sp>
       <p:sp>
         <p:nvSpPr>
-          <p:cNvPr id="682" name="Rectangle"/>
+          <p:cNvPr id="681" name="Rectangle"/>
           <p:cNvSpPr/>
           <p:nvPr/>
         </p:nvSpPr>
@@ -38333,7 +38304,7 @@
       </p:sp>
       <p:sp>
         <p:nvSpPr>
-          <p:cNvPr id="683" name="Rectangle"/>
+          <p:cNvPr id="682" name="Rectangle"/>
           <p:cNvSpPr/>
           <p:nvPr/>
         </p:nvSpPr>
@@ -38390,7 +38361,7 @@
       </p:sp>
       <p:sp>
         <p:nvSpPr>
-          <p:cNvPr id="684" name="SUBTITLE"/>
+          <p:cNvPr id="683" name="SUBTITLE"/>
           <p:cNvSpPr txBox="1"/>
           <p:nvPr/>
         </p:nvSpPr>
@@ -38433,7 +38404,7 @@
       </p:sp>
       <p:sp>
         <p:nvSpPr>
-          <p:cNvPr id="685" name="every(.x, .p, …) Do all element pass a test?…"/>
+          <p:cNvPr id="684" name="every(.x, .p, …) Do all element pass a test?…"/>
           <p:cNvSpPr txBox="1"/>
           <p:nvPr/>
         </p:nvSpPr>
@@ -38697,7 +38668,7 @@
       </p:sp>
       <p:sp>
         <p:nvSpPr>
-          <p:cNvPr id="686" name="Rectangle 194"/>
+          <p:cNvPr id="685" name="Rectangle 194"/>
           <p:cNvSpPr/>
           <p:nvPr/>
         </p:nvSpPr>
@@ -38752,7 +38723,7 @@
       </p:sp>
       <p:sp>
         <p:nvSpPr>
-          <p:cNvPr id="687" name="Freeform: Shape 195"/>
+          <p:cNvPr id="686" name="Freeform: Shape 195"/>
           <p:cNvSpPr/>
           <p:nvPr/>
         </p:nvSpPr>
@@ -38819,7 +38790,7 @@
       </p:sp>
       <p:grpSp>
         <p:nvGrpSpPr>
-          <p:cNvPr id="690" name="Rectangle 196"/>
+          <p:cNvPr id="689" name="Rectangle 196"/>
           <p:cNvGrpSpPr/>
           <p:nvPr/>
         </p:nvGrpSpPr>
@@ -38833,7 +38804,7 @@
         </p:grpSpPr>
         <p:sp>
           <p:nvSpPr>
-            <p:cNvPr id="688" name="Square"/>
+            <p:cNvPr id="687" name="Square"/>
             <p:cNvSpPr/>
             <p:nvPr/>
           </p:nvSpPr>
@@ -38891,7 +38862,7 @@
         </p:sp>
         <p:sp>
           <p:nvSpPr>
-            <p:cNvPr id="689" name="α"/>
+            <p:cNvPr id="688" name="α"/>
             <p:cNvSpPr txBox="1"/>
             <p:nvPr/>
           </p:nvSpPr>
@@ -38949,7 +38920,7 @@
       </p:grpSp>
       <p:sp>
         <p:nvSpPr>
-          <p:cNvPr id="691" name="Freeform: Shape 199"/>
+          <p:cNvPr id="690" name="Freeform: Shape 199"/>
           <p:cNvSpPr/>
           <p:nvPr/>
         </p:nvSpPr>
@@ -39016,7 +38987,7 @@
       </p:sp>
       <p:sp>
         <p:nvSpPr>
-          <p:cNvPr id="692" name="Rectangle 200"/>
+          <p:cNvPr id="691" name="Rectangle 200"/>
           <p:cNvSpPr/>
           <p:nvPr/>
         </p:nvSpPr>
@@ -39071,7 +39042,7 @@
       </p:sp>
       <p:sp>
         <p:nvSpPr>
-          <p:cNvPr id="693" name="Freeform: Shape 201"/>
+          <p:cNvPr id="692" name="Freeform: Shape 201"/>
           <p:cNvSpPr/>
           <p:nvPr/>
         </p:nvSpPr>
@@ -39138,7 +39109,7 @@
       </p:sp>
       <p:sp>
         <p:nvSpPr>
-          <p:cNvPr id="694" name="Straight Connector 11"/>
+          <p:cNvPr id="693" name="Straight Connector 11"/>
           <p:cNvSpPr/>
           <p:nvPr/>
         </p:nvSpPr>
@@ -39167,7 +39138,7 @@
       </p:sp>
       <p:sp>
         <p:nvSpPr>
-          <p:cNvPr id="695" name="Straight Connector 202"/>
+          <p:cNvPr id="694" name="Straight Connector 202"/>
           <p:cNvSpPr/>
           <p:nvPr/>
         </p:nvSpPr>
@@ -39196,7 +39167,7 @@
       </p:sp>
       <p:sp>
         <p:nvSpPr>
-          <p:cNvPr id="696" name="Rectangle 203"/>
+          <p:cNvPr id="695" name="Rectangle 203"/>
           <p:cNvSpPr/>
           <p:nvPr/>
         </p:nvSpPr>
@@ -39251,7 +39222,7 @@
       </p:sp>
       <p:sp>
         <p:nvSpPr>
-          <p:cNvPr id="697" name="Straight Connector 18"/>
+          <p:cNvPr id="696" name="Straight Connector 18"/>
           <p:cNvSpPr/>
           <p:nvPr/>
         </p:nvSpPr>
@@ -39279,7 +39250,7 @@
       </p:sp>
       <p:sp>
         <p:nvSpPr>
-          <p:cNvPr id="698" name="Rectangle 204"/>
+          <p:cNvPr id="697" name="Rectangle 204"/>
           <p:cNvSpPr/>
           <p:nvPr/>
         </p:nvSpPr>
@@ -39334,7 +39305,7 @@
       </p:sp>
       <p:sp>
         <p:nvSpPr>
-          <p:cNvPr id="699" name="Freeform: Shape 205"/>
+          <p:cNvPr id="698" name="Freeform: Shape 205"/>
           <p:cNvSpPr/>
           <p:nvPr/>
         </p:nvSpPr>
@@ -39405,7 +39376,7 @@
       </p:sp>
       <p:sp>
         <p:nvSpPr>
-          <p:cNvPr id="700" name="SUBTITLE"/>
+          <p:cNvPr id="699" name="SUBTITLE"/>
           <p:cNvSpPr txBox="1"/>
           <p:nvPr/>
         </p:nvSpPr>
@@ -39448,7 +39419,7 @@
       </p:sp>
       <p:sp>
         <p:nvSpPr>
-          <p:cNvPr id="701" name="every(.x, .p, …) Do all element pass a test?…"/>
+          <p:cNvPr id="700" name="every(.x, .p, …) Do all element pass a test?…"/>
           <p:cNvSpPr txBox="1"/>
           <p:nvPr/>
         </p:nvSpPr>
@@ -39610,7 +39581,7 @@
       </p:sp>
       <p:sp>
         <p:nvSpPr>
-          <p:cNvPr id="702" name="SUBTITLE"/>
+          <p:cNvPr id="701" name="SUBTITLE"/>
           <p:cNvSpPr txBox="1"/>
           <p:nvPr/>
         </p:nvSpPr>
@@ -39653,7 +39624,7 @@
       </p:sp>
       <p:sp>
         <p:nvSpPr>
-          <p:cNvPr id="703" name="every(.x, .p, …) Do all element pass a test?…"/>
+          <p:cNvPr id="702" name="every(.x, .p, …) Do all element pass a test?…"/>
           <p:cNvSpPr txBox="1"/>
           <p:nvPr/>
         </p:nvSpPr>
@@ -39740,7 +39711,7 @@
       </p:sp>
       <p:sp>
         <p:nvSpPr>
-          <p:cNvPr id="704" name="SUBTITLE"/>
+          <p:cNvPr id="703" name="SUBTITLE"/>
           <p:cNvSpPr txBox="1"/>
           <p:nvPr/>
         </p:nvSpPr>
@@ -39783,7 +39754,7 @@
       </p:sp>
       <p:sp>
         <p:nvSpPr>
-          <p:cNvPr id="705" name="every(.x, .p, …) Do all element pass a test?…"/>
+          <p:cNvPr id="704" name="every(.x, .p, …) Do all element pass a test?…"/>
           <p:cNvSpPr txBox="1"/>
           <p:nvPr/>
         </p:nvSpPr>
@@ -40070,7 +40041,7 @@
       </p:sp>
       <p:sp>
         <p:nvSpPr>
-          <p:cNvPr id="706" name="Rectangle 227"/>
+          <p:cNvPr id="705" name="Rectangle 227"/>
           <p:cNvSpPr/>
           <p:nvPr/>
         </p:nvSpPr>
@@ -40125,7 +40096,7 @@
       </p:sp>
       <p:sp>
         <p:nvSpPr>
-          <p:cNvPr id="707" name="Rectangle 228"/>
+          <p:cNvPr id="706" name="Rectangle 228"/>
           <p:cNvSpPr/>
           <p:nvPr/>
         </p:nvSpPr>
@@ -40180,7 +40151,7 @@
       </p:sp>
       <p:sp>
         <p:nvSpPr>
-          <p:cNvPr id="708" name="Rectangle 229"/>
+          <p:cNvPr id="707" name="Rectangle 229"/>
           <p:cNvSpPr/>
           <p:nvPr/>
         </p:nvSpPr>
@@ -40235,7 +40206,7 @@
       </p:sp>
       <p:sp>
         <p:nvSpPr>
-          <p:cNvPr id="709" name="Rectangle 230"/>
+          <p:cNvPr id="708" name="Rectangle 230"/>
           <p:cNvSpPr/>
           <p:nvPr/>
         </p:nvSpPr>
@@ -40290,7 +40261,7 @@
       </p:sp>
       <p:sp>
         <p:nvSpPr>
-          <p:cNvPr id="710" name="Rectangle 231"/>
+          <p:cNvPr id="709" name="Rectangle 231"/>
           <p:cNvSpPr/>
           <p:nvPr/>
         </p:nvSpPr>
@@ -40345,7 +40316,7 @@
       </p:sp>
       <p:sp>
         <p:nvSpPr>
-          <p:cNvPr id="711" name="Rectangle 232"/>
+          <p:cNvPr id="710" name="Rectangle 232"/>
           <p:cNvSpPr/>
           <p:nvPr/>
         </p:nvSpPr>
@@ -40400,10 +40371,10 @@
       </p:sp>
       <p:cxnSp>
         <p:nvCxnSpPr>
-          <p:cNvPr id="712" name="Straight Arrow Connector 233"/>
+          <p:cNvPr id="711" name="Straight Arrow Connector 233"/>
           <p:cNvCxnSpPr>
-            <a:stCxn id="708" idx="0"/>
-            <a:endCxn id="711" idx="0"/>
+            <a:stCxn id="707" idx="0"/>
+            <a:endCxn id="710" idx="0"/>
           </p:cNvCxnSpPr>
           <p:nvPr/>
         </p:nvCxnSpPr>
@@ -40424,10 +40395,10 @@
       </p:cxnSp>
       <p:cxnSp>
         <p:nvCxnSpPr>
-          <p:cNvPr id="713" name="Straight Arrow Connector 234"/>
+          <p:cNvPr id="712" name="Straight Arrow Connector 234"/>
           <p:cNvCxnSpPr>
-            <a:stCxn id="706" idx="0"/>
-            <a:endCxn id="710" idx="0"/>
+            <a:stCxn id="705" idx="0"/>
+            <a:endCxn id="709" idx="0"/>
           </p:cNvCxnSpPr>
           <p:nvPr/>
         </p:nvCxnSpPr>
@@ -40448,7 +40419,7 @@
       </p:cxnSp>
       <p:grpSp>
         <p:nvGrpSpPr>
-          <p:cNvPr id="718" name="Cube 235"/>
+          <p:cNvPr id="717" name="Cube 235"/>
           <p:cNvGrpSpPr/>
           <p:nvPr/>
         </p:nvGrpSpPr>
@@ -40462,7 +40433,7 @@
         </p:grpSpPr>
         <p:sp>
           <p:nvSpPr>
-            <p:cNvPr id="714" name="Shape"/>
+            <p:cNvPr id="713" name="Shape"/>
             <p:cNvSpPr/>
             <p:nvPr/>
           </p:nvSpPr>
@@ -40551,7 +40522,7 @@
         </p:sp>
         <p:sp>
           <p:nvSpPr>
-            <p:cNvPr id="715" name="Shape"/>
+            <p:cNvPr id="714" name="Shape"/>
             <p:cNvSpPr/>
             <p:nvPr/>
           </p:nvSpPr>
@@ -40636,7 +40607,7 @@
         </p:sp>
         <p:sp>
           <p:nvSpPr>
-            <p:cNvPr id="716" name="Shape"/>
+            <p:cNvPr id="715" name="Shape"/>
             <p:cNvSpPr/>
             <p:nvPr/>
           </p:nvSpPr>
@@ -40721,7 +40692,7 @@
         </p:sp>
         <p:sp>
           <p:nvSpPr>
-            <p:cNvPr id="717" name="Shape"/>
+            <p:cNvPr id="716" name="Shape"/>
             <p:cNvSpPr/>
             <p:nvPr/>
           </p:nvSpPr>
@@ -40827,7 +40798,7 @@
       </p:grpSp>
       <p:grpSp>
         <p:nvGrpSpPr>
-          <p:cNvPr id="723" name="Cube 236"/>
+          <p:cNvPr id="722" name="Cube 236"/>
           <p:cNvGrpSpPr/>
           <p:nvPr/>
         </p:nvGrpSpPr>
@@ -40841,7 +40812,7 @@
         </p:grpSpPr>
         <p:sp>
           <p:nvSpPr>
-            <p:cNvPr id="719" name="Shape"/>
+            <p:cNvPr id="718" name="Shape"/>
             <p:cNvSpPr/>
             <p:nvPr/>
           </p:nvSpPr>
@@ -40930,7 +40901,7 @@
         </p:sp>
         <p:sp>
           <p:nvSpPr>
-            <p:cNvPr id="720" name="Shape"/>
+            <p:cNvPr id="719" name="Shape"/>
             <p:cNvSpPr/>
             <p:nvPr/>
           </p:nvSpPr>
@@ -41015,7 +40986,7 @@
         </p:sp>
         <p:sp>
           <p:nvSpPr>
-            <p:cNvPr id="721" name="Shape"/>
+            <p:cNvPr id="720" name="Shape"/>
             <p:cNvSpPr/>
             <p:nvPr/>
           </p:nvSpPr>
@@ -41100,7 +41071,7 @@
         </p:sp>
         <p:sp>
           <p:nvSpPr>
-            <p:cNvPr id="722" name="Shape"/>
+            <p:cNvPr id="721" name="Shape"/>
             <p:cNvSpPr/>
             <p:nvPr/>
           </p:nvSpPr>
@@ -41206,7 +41177,7 @@
       </p:grpSp>
       <p:grpSp>
         <p:nvGrpSpPr>
-          <p:cNvPr id="728" name="Cube 237"/>
+          <p:cNvPr id="727" name="Cube 237"/>
           <p:cNvGrpSpPr/>
           <p:nvPr/>
         </p:nvGrpSpPr>
@@ -41220,7 +41191,7 @@
         </p:grpSpPr>
         <p:sp>
           <p:nvSpPr>
-            <p:cNvPr id="724" name="Shape"/>
+            <p:cNvPr id="723" name="Shape"/>
             <p:cNvSpPr/>
             <p:nvPr/>
           </p:nvSpPr>
@@ -41309,7 +41280,7 @@
         </p:sp>
         <p:sp>
           <p:nvSpPr>
-            <p:cNvPr id="725" name="Shape"/>
+            <p:cNvPr id="724" name="Shape"/>
             <p:cNvSpPr/>
             <p:nvPr/>
           </p:nvSpPr>
@@ -41394,7 +41365,7 @@
         </p:sp>
         <p:sp>
           <p:nvSpPr>
-            <p:cNvPr id="726" name="Shape"/>
+            <p:cNvPr id="725" name="Shape"/>
             <p:cNvSpPr/>
             <p:nvPr/>
           </p:nvSpPr>
@@ -41479,7 +41450,7 @@
         </p:sp>
         <p:sp>
           <p:nvSpPr>
-            <p:cNvPr id="727" name="Shape"/>
+            <p:cNvPr id="726" name="Shape"/>
             <p:cNvSpPr/>
             <p:nvPr/>
           </p:nvSpPr>
@@ -41585,7 +41556,7 @@
       </p:grpSp>
       <p:grpSp>
         <p:nvGrpSpPr>
-          <p:cNvPr id="733" name="Cube 238"/>
+          <p:cNvPr id="732" name="Cube 238"/>
           <p:cNvGrpSpPr/>
           <p:nvPr/>
         </p:nvGrpSpPr>
@@ -41599,7 +41570,7 @@
         </p:grpSpPr>
         <p:sp>
           <p:nvSpPr>
-            <p:cNvPr id="729" name="Shape"/>
+            <p:cNvPr id="728" name="Shape"/>
             <p:cNvSpPr/>
             <p:nvPr/>
           </p:nvSpPr>
@@ -41688,7 +41659,7 @@
         </p:sp>
         <p:sp>
           <p:nvSpPr>
-            <p:cNvPr id="730" name="Shape"/>
+            <p:cNvPr id="729" name="Shape"/>
             <p:cNvSpPr/>
             <p:nvPr/>
           </p:nvSpPr>
@@ -41773,7 +41744,7 @@
         </p:sp>
         <p:sp>
           <p:nvSpPr>
-            <p:cNvPr id="731" name="Shape"/>
+            <p:cNvPr id="730" name="Shape"/>
             <p:cNvSpPr/>
             <p:nvPr/>
           </p:nvSpPr>
@@ -41858,7 +41829,7 @@
         </p:sp>
         <p:sp>
           <p:nvSpPr>
-            <p:cNvPr id="732" name="Shape"/>
+            <p:cNvPr id="731" name="Shape"/>
             <p:cNvSpPr/>
             <p:nvPr/>
           </p:nvSpPr>
@@ -41964,7 +41935,7 @@
       </p:grpSp>
       <p:grpSp>
         <p:nvGrpSpPr>
-          <p:cNvPr id="738" name="Cube 239"/>
+          <p:cNvPr id="737" name="Cube 239"/>
           <p:cNvGrpSpPr/>
           <p:nvPr/>
         </p:nvGrpSpPr>
@@ -41978,7 +41949,7 @@
         </p:grpSpPr>
         <p:sp>
           <p:nvSpPr>
-            <p:cNvPr id="734" name="Shape"/>
+            <p:cNvPr id="733" name="Shape"/>
             <p:cNvSpPr/>
             <p:nvPr/>
           </p:nvSpPr>
@@ -42067,7 +42038,7 @@
         </p:sp>
         <p:sp>
           <p:nvSpPr>
-            <p:cNvPr id="735" name="Shape"/>
+            <p:cNvPr id="734" name="Shape"/>
             <p:cNvSpPr/>
             <p:nvPr/>
           </p:nvSpPr>
@@ -42152,7 +42123,7 @@
         </p:sp>
         <p:sp>
           <p:nvSpPr>
-            <p:cNvPr id="736" name="Shape"/>
+            <p:cNvPr id="735" name="Shape"/>
             <p:cNvSpPr/>
             <p:nvPr/>
           </p:nvSpPr>
@@ -42237,7 +42208,7 @@
         </p:sp>
         <p:sp>
           <p:nvSpPr>
-            <p:cNvPr id="737" name="Shape"/>
+            <p:cNvPr id="736" name="Shape"/>
             <p:cNvSpPr/>
             <p:nvPr/>
           </p:nvSpPr>
@@ -42343,7 +42314,7 @@
       </p:grpSp>
       <p:grpSp>
         <p:nvGrpSpPr>
-          <p:cNvPr id="743" name="Cube 240"/>
+          <p:cNvPr id="742" name="Cube 240"/>
           <p:cNvGrpSpPr/>
           <p:nvPr/>
         </p:nvGrpSpPr>
@@ -42357,7 +42328,7 @@
         </p:grpSpPr>
         <p:sp>
           <p:nvSpPr>
-            <p:cNvPr id="739" name="Shape"/>
+            <p:cNvPr id="738" name="Shape"/>
             <p:cNvSpPr/>
             <p:nvPr/>
           </p:nvSpPr>
@@ -42446,7 +42417,7 @@
         </p:sp>
         <p:sp>
           <p:nvSpPr>
-            <p:cNvPr id="740" name="Shape"/>
+            <p:cNvPr id="739" name="Shape"/>
             <p:cNvSpPr/>
             <p:nvPr/>
           </p:nvSpPr>
@@ -42531,7 +42502,7 @@
         </p:sp>
         <p:sp>
           <p:nvSpPr>
-            <p:cNvPr id="741" name="Shape"/>
+            <p:cNvPr id="740" name="Shape"/>
             <p:cNvSpPr/>
             <p:nvPr/>
           </p:nvSpPr>
@@ -42616,7 +42587,7 @@
         </p:sp>
         <p:sp>
           <p:nvSpPr>
-            <p:cNvPr id="742" name="Shape"/>
+            <p:cNvPr id="741" name="Shape"/>
             <p:cNvSpPr/>
             <p:nvPr/>
           </p:nvSpPr>
@@ -42832,7 +42803,7 @@
       </p:sp>
       <p:sp>
         <p:nvSpPr>
-          <p:cNvPr id="746" name="Rectangle 243"/>
+          <p:cNvPr id="745" name="Rectangle 243"/>
           <p:cNvSpPr/>
           <p:nvPr/>
         </p:nvSpPr>
@@ -42887,7 +42858,7 @@
       </p:sp>
       <p:sp>
         <p:nvSpPr>
-          <p:cNvPr id="747" name="Rectangle 244"/>
+          <p:cNvPr id="746" name="Rectangle 244"/>
           <p:cNvSpPr/>
           <p:nvPr/>
         </p:nvSpPr>
@@ -42942,7 +42913,7 @@
       </p:sp>
       <p:sp>
         <p:nvSpPr>
-          <p:cNvPr id="748" name="Rectangle 245"/>
+          <p:cNvPr id="747" name="Rectangle 245"/>
           <p:cNvSpPr/>
           <p:nvPr/>
         </p:nvSpPr>
@@ -42997,7 +42968,7 @@
       </p:sp>
       <p:sp>
         <p:nvSpPr>
-          <p:cNvPr id="749" name="Rectangle 246"/>
+          <p:cNvPr id="748" name="Rectangle 246"/>
           <p:cNvSpPr/>
           <p:nvPr/>
         </p:nvSpPr>
@@ -43052,7 +43023,7 @@
       </p:sp>
       <p:sp>
         <p:nvSpPr>
-          <p:cNvPr id="750" name="Rectangle 247"/>
+          <p:cNvPr id="749" name="Rectangle 247"/>
           <p:cNvSpPr/>
           <p:nvPr/>
         </p:nvSpPr>
@@ -43107,7 +43078,7 @@
       </p:sp>
       <p:sp>
         <p:nvSpPr>
-          <p:cNvPr id="751" name="Rectangle 248"/>
+          <p:cNvPr id="750" name="Rectangle 248"/>
           <p:cNvSpPr/>
           <p:nvPr/>
         </p:nvSpPr>
@@ -43162,7 +43133,7 @@
       </p:sp>
       <p:grpSp>
         <p:nvGrpSpPr>
-          <p:cNvPr id="755" name="Arrow: Curved Down 12"/>
+          <p:cNvPr id="754" name="Arrow: Curved Down 12"/>
           <p:cNvGrpSpPr/>
           <p:nvPr/>
         </p:nvGrpSpPr>
@@ -43176,7 +43147,7 @@
         </p:grpSpPr>
         <p:sp>
           <p:nvSpPr>
-            <p:cNvPr id="752" name="Shape"/>
+            <p:cNvPr id="751" name="Shape"/>
             <p:cNvSpPr/>
             <p:nvPr/>
           </p:nvSpPr>
@@ -43303,7 +43274,7 @@
         </p:sp>
         <p:sp>
           <p:nvSpPr>
-            <p:cNvPr id="753" name="Shape"/>
+            <p:cNvPr id="752" name="Shape"/>
             <p:cNvSpPr/>
             <p:nvPr/>
           </p:nvSpPr>
@@ -43400,7 +43371,7 @@
         </p:sp>
         <p:sp>
           <p:nvSpPr>
-            <p:cNvPr id="754" name="Line"/>
+            <p:cNvPr id="753" name="Line"/>
             <p:cNvSpPr/>
             <p:nvPr/>
           </p:nvSpPr>
@@ -43516,7 +43487,7 @@
       </p:grpSp>
       <p:sp>
         <p:nvSpPr>
-          <p:cNvPr id="756" name="Rectangle"/>
+          <p:cNvPr id="755" name="Rectangle"/>
           <p:cNvSpPr/>
           <p:nvPr/>
         </p:nvSpPr>
@@ -43573,7 +43544,7 @@
       </p:sp>
       <p:sp>
         <p:nvSpPr>
-          <p:cNvPr id="757" name="every(.x, .p, …) Do all element pass a test?…"/>
+          <p:cNvPr id="756" name="every(.x, .p, …) Do all element pass a test?…"/>
           <p:cNvSpPr txBox="1"/>
           <p:nvPr/>
         </p:nvSpPr>
@@ -43902,7 +43873,7 @@
                     <a:srgbClr val="0000FF"/>
                   </a:solidFill>
                 </a:uFill>
-                <a:hlinkClick r:id="rId3" invalidUrl="" action="" tgtFrame="" tooltip="" history="1" highlightClick="0" endSnd="0"/>
+                <a:hlinkClick r:id="rId2" invalidUrl="" action="" tgtFrame="" tooltip="" history="1" highlightClick="0" endSnd="0"/>
               </a:rPr>
               <a:t>ImageNet</a:t>
             </a:r>
@@ -43976,7 +43947,7 @@
       </p:sp>
       <p:sp>
         <p:nvSpPr>
-          <p:cNvPr id="758" name="Thank you for making a new cheatsheet for R! These cheatsheets have an important job:"/>
+          <p:cNvPr id="757" name="Thank you for making a new cheatsheet for R! These cheatsheets have an important job:"/>
           <p:cNvSpPr txBox="1"/>
           <p:nvPr/>
         </p:nvSpPr>
@@ -44028,38 +43999,9 @@
           </a:p>
         </p:txBody>
       </p:sp>
-      <p:pic>
-        <p:nvPicPr>
-          <p:cNvPr id="759" name="Picture 2" descr="Picture 2"/>
-          <p:cNvPicPr>
-            <a:picLocks noChangeAspect="1"/>
-          </p:cNvPicPr>
-          <p:nvPr/>
-        </p:nvPicPr>
-        <p:blipFill>
-          <a:blip r:embed="rId4">
-            <a:extLst/>
-          </a:blip>
-          <a:stretch>
-            <a:fillRect/>
-          </a:stretch>
-        </p:blipFill>
-        <p:spPr>
-          <a:xfrm>
-            <a:off x="10683037" y="6629417"/>
-            <a:ext cx="1184831" cy="163244"/>
-          </a:xfrm>
-          <a:prstGeom prst="rect">
-            <a:avLst/>
-          </a:prstGeom>
-          <a:ln w="12700">
-            <a:miter lim="400000"/>
-          </a:ln>
-        </p:spPr>
-      </p:pic>
       <p:sp>
         <p:nvSpPr>
-          <p:cNvPr id="760" name="Rectangle"/>
+          <p:cNvPr id="758" name="Rectangle"/>
           <p:cNvSpPr/>
           <p:nvPr/>
         </p:nvSpPr>
@@ -44116,7 +44058,7 @@
       </p:sp>
       <p:sp>
         <p:nvSpPr>
-          <p:cNvPr id="761" name="Thank you for making a new cheatsheet for R! These cheatsheets have an important job:"/>
+          <p:cNvPr id="759" name="Thank you for making a new cheatsheet for R! These cheatsheets have an important job:"/>
           <p:cNvSpPr txBox="1"/>
           <p:nvPr/>
         </p:nvSpPr>
@@ -44247,7 +44189,7 @@
       </p:sp>
       <p:sp>
         <p:nvSpPr>
-          <p:cNvPr id="762" name="Basics"/>
+          <p:cNvPr id="760" name="Basics"/>
           <p:cNvSpPr txBox="1"/>
           <p:nvPr/>
         </p:nvSpPr>
@@ -44299,7 +44241,7 @@
       </p:sp>
       <p:sp>
         <p:nvSpPr>
-          <p:cNvPr id="763" name="Basics"/>
+          <p:cNvPr id="761" name="Basics"/>
           <p:cNvSpPr txBox="1"/>
           <p:nvPr/>
         </p:nvSpPr>
@@ -44349,9 +44291,204 @@
           </a:p>
         </p:txBody>
       </p:sp>
+      <p:sp>
+        <p:nvSpPr>
+          <p:cNvPr id="762" name="RStudio® is a trademark of RStudio, Inc.  •  CC BY RStudio •  info@rstudio.com  •  844-448-1212 • rstudio.com •  Learn more at spark.rstudio.com  •  sparklyr  0.5  •  Updated: 2016-12"/>
+          <p:cNvSpPr txBox="1"/>
+          <p:nvPr/>
+        </p:nvSpPr>
+        <p:spPr>
+          <a:xfrm>
+            <a:off x="2353571" y="10340910"/>
+            <a:ext cx="11322668" cy="248841"/>
+          </a:xfrm>
+          <a:prstGeom prst="rect">
+            <a:avLst/>
+          </a:prstGeom>
+          <a:ln w="12700">
+            <a:miter lim="400000"/>
+          </a:ln>
+          <a:extLst>
+            <a:ext uri="{C572A759-6A51-4108-AA02-DFA0A04FC94B}">
+              <ma14:wrappingTextBoxFlag xmlns:ma14="http://schemas.microsoft.com/office/mac/drawingml/2011/main" val="1"/>
+            </a:ext>
+          </a:extLst>
+        </p:spPr>
+        <p:txBody>
+          <a:bodyPr lIns="54569" tIns="54569" rIns="54569" bIns="54569" anchor="ctr">
+            <a:spAutoFit/>
+          </a:bodyPr>
+          <a:lstStyle/>
+          <a:p>
+            <a:pPr algn="r">
+              <a:lnSpc>
+                <a:spcPct val="90000"/>
+              </a:lnSpc>
+              <a:spcBef>
+                <a:spcPts val="0"/>
+              </a:spcBef>
+              <a:defRPr sz="900">
+                <a:solidFill>
+                  <a:srgbClr val="000000"/>
+                </a:solidFill>
+                <a:latin typeface="Source Sans Pro"/>
+                <a:ea typeface="Source Sans Pro"/>
+                <a:cs typeface="Source Sans Pro"/>
+                <a:sym typeface="Source Sans Pro"/>
+              </a:defRPr>
+            </a:pPr>
+            <a:r>
+              <a:t>RStudio® is a trademark of RStudio, Inc.  •  </a:t>
+            </a:r>
+            <a:r>
+              <a:rPr>
+                <a:hlinkClick r:id="rId3" invalidUrl="" action="" tgtFrame="" tooltip="" history="1" highlightClick="0" endSnd="0"/>
+              </a:rPr>
+              <a:t>CC BY SA</a:t>
+            </a:r>
+            <a:r>
+              <a:t>  </a:t>
+            </a:r>
+            <a:r>
+              <a:t>RStudio •  </a:t>
+            </a:r>
+            <a:r>
+              <a:rPr u="sng">
+                <a:solidFill>
+                  <a:srgbClr val="D77A00"/>
+                </a:solidFill>
+                <a:uFill>
+                  <a:solidFill>
+                    <a:srgbClr val="0000FF"/>
+                  </a:solidFill>
+                </a:uFill>
+                <a:hlinkClick r:id="rId4" invalidUrl="" action="" tgtFrame="" tooltip="" history="1" highlightClick="0" endSnd="0"/>
+              </a:rPr>
+              <a:t>info@rstudio.com</a:t>
+            </a:r>
+            <a:r>
+              <a:rPr>
+                <a:solidFill>
+                  <a:srgbClr val="D77A00"/>
+                </a:solidFill>
+              </a:rPr>
+              <a:t>  </a:t>
+            </a:r>
+            <a:r>
+              <a:t>•  844-448-1212 • </a:t>
+            </a:r>
+            <a:r>
+              <a:rPr u="sng">
+                <a:solidFill>
+                  <a:srgbClr val="D77A00"/>
+                </a:solidFill>
+                <a:uFill>
+                  <a:solidFill>
+                    <a:srgbClr val="0000FF"/>
+                  </a:solidFill>
+                </a:uFill>
+                <a:hlinkClick r:id="rId5" invalidUrl="" action="" tgtFrame="" tooltip="" history="1" highlightClick="0" endSnd="0"/>
+              </a:rPr>
+              <a:t>rstudio.com</a:t>
+            </a:r>
+            <a:r>
+              <a:rPr>
+                <a:solidFill>
+                  <a:srgbClr val="D77A00"/>
+                </a:solidFill>
+              </a:rPr>
+              <a:t> </a:t>
+            </a:r>
+            <a:r>
+              <a:t>•  Learn more at </a:t>
+            </a:r>
+            <a:r>
+              <a:rPr b="1"/>
+              <a:t>keras</a:t>
+            </a:r>
+            <a:r>
+              <a:rPr b="1"/>
+              <a:t>.rstudio.com</a:t>
+            </a:r>
+            <a:r>
+              <a:t>  •  </a:t>
+            </a:r>
+            <a:r>
+              <a:t>keras 2.1.2</a:t>
+            </a:r>
+            <a:r>
+              <a:t>  •  Updated: 201</a:t>
+            </a:r>
+            <a:r>
+              <a:t>7</a:t>
+            </a:r>
+            <a:r>
+              <a:t>-12</a:t>
+            </a:r>
+          </a:p>
+        </p:txBody>
+      </p:sp>
+      <p:pic>
+        <p:nvPicPr>
+          <p:cNvPr id="763" name="pasted-image.pdf" descr="pasted-image.pdf"/>
+          <p:cNvPicPr>
+            <a:picLocks noChangeAspect="1"/>
+          </p:cNvPicPr>
+          <p:nvPr/>
+        </p:nvPicPr>
+        <p:blipFill>
+          <a:blip r:embed="rId6">
+            <a:extLst/>
+          </a:blip>
+          <a:stretch>
+            <a:fillRect/>
+          </a:stretch>
+        </p:blipFill>
+        <p:spPr>
+          <a:xfrm>
+            <a:off x="238822" y="9978473"/>
+            <a:ext cx="1754523" cy="616479"/>
+          </a:xfrm>
+          <a:prstGeom prst="rect">
+            <a:avLst/>
+          </a:prstGeom>
+          <a:ln w="12700">
+            <a:miter lim="400000"/>
+          </a:ln>
+        </p:spPr>
+      </p:pic>
+      <p:pic>
+        <p:nvPicPr>
+          <p:cNvPr id="764" name="Picture 2" descr="Picture 2"/>
+          <p:cNvPicPr>
+            <a:picLocks noChangeAspect="1"/>
+          </p:cNvPicPr>
+          <p:nvPr/>
+        </p:nvPicPr>
+        <p:blipFill>
+          <a:blip r:embed="rId7">
+            <a:extLst/>
+          </a:blip>
+          <a:stretch>
+            <a:fillRect/>
+          </a:stretch>
+        </p:blipFill>
+        <p:spPr>
+          <a:xfrm>
+            <a:off x="10683037" y="6629417"/>
+            <a:ext cx="1184831" cy="163244"/>
+          </a:xfrm>
+          <a:prstGeom prst="rect">
+            <a:avLst/>
+          </a:prstGeom>
+          <a:ln w="12700">
+            <a:miter lim="400000"/>
+          </a:ln>
+        </p:spPr>
+      </p:pic>
       <p:grpSp>
         <p:nvGrpSpPr>
-          <p:cNvPr id="770" name="Group 265"/>
+          <p:cNvPr id="771" name="Group 265"/>
           <p:cNvGrpSpPr/>
           <p:nvPr/>
         </p:nvGrpSpPr>
@@ -44365,7 +44502,7 @@
         </p:grpSpPr>
         <p:grpSp>
           <p:nvGrpSpPr>
-            <p:cNvPr id="766" name="Group 266"/>
+            <p:cNvPr id="767" name="Group 266"/>
             <p:cNvGrpSpPr/>
             <p:nvPr/>
           </p:nvGrpSpPr>
@@ -44379,14 +44516,14 @@
           </p:grpSpPr>
           <p:pic>
             <p:nvPicPr>
-              <p:cNvPr id="764" name="Picture 4" descr="Picture 4"/>
+              <p:cNvPr id="765" name="Picture 4" descr="Picture 4"/>
               <p:cNvPicPr>
                 <a:picLocks noChangeAspect="1"/>
               </p:cNvPicPr>
               <p:nvPr/>
             </p:nvPicPr>
             <p:blipFill>
-              <a:blip r:embed="rId5">
+              <a:blip r:embed="rId8">
                 <a:extLst/>
               </a:blip>
               <a:stretch>
@@ -44410,7 +44547,7 @@
           </p:pic>
           <p:sp>
             <p:nvSpPr>
-              <p:cNvPr id="765" name="Rectangle 271"/>
+              <p:cNvPr id="766" name="Rectangle 271"/>
               <p:cNvSpPr txBox="1"/>
               <p:nvPr/>
             </p:nvSpPr>
@@ -44462,7 +44599,7 @@
         </p:grpSp>
         <p:grpSp>
           <p:nvGrpSpPr>
-            <p:cNvPr id="769" name="Group 267"/>
+            <p:cNvPr id="770" name="Group 267"/>
             <p:cNvGrpSpPr/>
             <p:nvPr/>
           </p:nvGrpSpPr>
@@ -44476,14 +44613,14 @@
           </p:grpSpPr>
           <p:pic>
             <p:nvPicPr>
-              <p:cNvPr id="767" name="Picture 2" descr="Picture 2"/>
+              <p:cNvPr id="768" name="Picture 2" descr="Picture 2"/>
               <p:cNvPicPr>
                 <a:picLocks noChangeAspect="1"/>
               </p:cNvPicPr>
               <p:nvPr/>
             </p:nvPicPr>
             <p:blipFill>
-              <a:blip r:embed="rId6">
+              <a:blip r:embed="rId9">
                 <a:extLst/>
               </a:blip>
               <a:stretch>
@@ -44507,7 +44644,7 @@
           </p:pic>
           <p:sp>
             <p:nvSpPr>
-              <p:cNvPr id="768" name="Rectangle 269"/>
+              <p:cNvPr id="769" name="Rectangle 269"/>
               <p:cNvSpPr txBox="1"/>
               <p:nvPr/>
             </p:nvSpPr>
@@ -44564,143 +44701,6 @@
           </p:sp>
         </p:grpSp>
       </p:grpSp>
-      <p:sp>
-        <p:nvSpPr>
-          <p:cNvPr id="771" name="RStudio® is a trademark of RStudio, Inc.  •  CC BY RStudio •  info@rstudio.com  •  844-448-1212 • rstudio.com •  Learn more at spark.rstudio.com  •  sparklyr  0.5  •  Updated: 2016-12"/>
-          <p:cNvSpPr txBox="1"/>
-          <p:nvPr/>
-        </p:nvSpPr>
-        <p:spPr>
-          <a:xfrm>
-            <a:off x="2353571" y="10340910"/>
-            <a:ext cx="11322668" cy="248841"/>
-          </a:xfrm>
-          <a:prstGeom prst="rect">
-            <a:avLst/>
-          </a:prstGeom>
-          <a:ln w="12700">
-            <a:miter lim="400000"/>
-          </a:ln>
-          <a:extLst>
-            <a:ext uri="{C572A759-6A51-4108-AA02-DFA0A04FC94B}">
-              <ma14:wrappingTextBoxFlag xmlns:ma14="http://schemas.microsoft.com/office/mac/drawingml/2011/main" val="1"/>
-            </a:ext>
-          </a:extLst>
-        </p:spPr>
-        <p:txBody>
-          <a:bodyPr lIns="54569" tIns="54569" rIns="54569" bIns="54569" anchor="ctr">
-            <a:spAutoFit/>
-          </a:bodyPr>
-          <a:lstStyle/>
-          <a:p>
-            <a:pPr algn="r">
-              <a:lnSpc>
-                <a:spcPct val="90000"/>
-              </a:lnSpc>
-              <a:spcBef>
-                <a:spcPts val="0"/>
-              </a:spcBef>
-              <a:defRPr sz="900">
-                <a:solidFill>
-                  <a:srgbClr val="000000"/>
-                </a:solidFill>
-                <a:latin typeface="Source Sans Pro"/>
-                <a:ea typeface="Source Sans Pro"/>
-                <a:cs typeface="Source Sans Pro"/>
-                <a:sym typeface="Source Sans Pro"/>
-              </a:defRPr>
-            </a:pPr>
-            <a:r>
-              <a:t>RStudio® is a trademark of RStudio, Inc.  •  </a:t>
-            </a:r>
-            <a:r>
-              <a:rPr>
-                <a:hlinkClick r:id="rId7" invalidUrl="" action="" tgtFrame="" tooltip="" history="1" highlightClick="0" endSnd="0"/>
-              </a:rPr>
-              <a:t>CC BY SA</a:t>
-            </a:r>
-            <a:r>
-              <a:t>  </a:t>
-            </a:r>
-            <a:r>
-              <a:t>RStudio •  </a:t>
-            </a:r>
-            <a:r>
-              <a:rPr u="sng">
-                <a:solidFill>
-                  <a:srgbClr val="D77A00"/>
-                </a:solidFill>
-                <a:uFill>
-                  <a:solidFill>
-                    <a:srgbClr val="0000FF"/>
-                  </a:solidFill>
-                </a:uFill>
-                <a:hlinkClick r:id="rId8" invalidUrl="" action="" tgtFrame="" tooltip="" history="1" highlightClick="0" endSnd="0"/>
-              </a:rPr>
-              <a:t>info@rstudio.com</a:t>
-            </a:r>
-            <a:r>
-              <a:rPr>
-                <a:solidFill>
-                  <a:srgbClr val="D77A00"/>
-                </a:solidFill>
-              </a:rPr>
-              <a:t>  </a:t>
-            </a:r>
-            <a:r>
-              <a:t>•  844-448-1212 • </a:t>
-            </a:r>
-            <a:r>
-              <a:rPr u="sng">
-                <a:solidFill>
-                  <a:srgbClr val="D77A00"/>
-                </a:solidFill>
-                <a:uFill>
-                  <a:solidFill>
-                    <a:srgbClr val="0000FF"/>
-                  </a:solidFill>
-                </a:uFill>
-                <a:hlinkClick r:id="rId9" invalidUrl="" action="" tgtFrame="" tooltip="" history="1" highlightClick="0" endSnd="0"/>
-              </a:rPr>
-              <a:t>rstudio.com</a:t>
-            </a:r>
-            <a:r>
-              <a:rPr>
-                <a:solidFill>
-                  <a:srgbClr val="D77A00"/>
-                </a:solidFill>
-              </a:rPr>
-              <a:t> </a:t>
-            </a:r>
-            <a:r>
-              <a:t>•  Learn more at </a:t>
-            </a:r>
-            <a:r>
-              <a:rPr b="1"/>
-              <a:t>keras</a:t>
-            </a:r>
-            <a:r>
-              <a:rPr b="1"/>
-              <a:t>.rstudio.com</a:t>
-            </a:r>
-            <a:r>
-              <a:t>  •  </a:t>
-            </a:r>
-            <a:r>
-              <a:t>keras 2.1.2</a:t>
-            </a:r>
-            <a:r>
-              <a:t>  •  Updated: 201</a:t>
-            </a:r>
-            <a:r>
-              <a:t>7</a:t>
-            </a:r>
-            <a:r>
-              <a:t>-12</a:t>
-            </a:r>
-          </a:p>
-        </p:txBody>
-      </p:sp>
     </p:spTree>
   </p:cSld>
   <p:clrMapOvr>

</xml_diff>